<commit_message>
Progress on the slides one
</commit_message>
<xml_diff>
--- a/Zero knowledge.pptx
+++ b/Zero knowledge.pptx
@@ -5,10 +5,10 @@
     <p:sldMasterId id="2147483648" r:id="rId4"/>
   </p:sldMasterIdLst>
   <p:notesMasterIdLst>
-    <p:notesMasterId r:id="rId13"/>
+    <p:notesMasterId r:id="rId19"/>
   </p:notesMasterIdLst>
   <p:handoutMasterIdLst>
-    <p:handoutMasterId r:id="rId14"/>
+    <p:handoutMasterId r:id="rId20"/>
   </p:handoutMasterIdLst>
   <p:sldIdLst>
     <p:sldId id="265" r:id="rId5"/>
@@ -17,13 +17,19 @@
     <p:sldId id="313" r:id="rId8"/>
     <p:sldId id="320" r:id="rId9"/>
     <p:sldId id="321" r:id="rId10"/>
-    <p:sldId id="322" r:id="rId11"/>
-    <p:sldId id="323" r:id="rId12"/>
+    <p:sldId id="324" r:id="rId11"/>
+    <p:sldId id="322" r:id="rId12"/>
+    <p:sldId id="323" r:id="rId13"/>
+    <p:sldId id="325" r:id="rId14"/>
+    <p:sldId id="326" r:id="rId15"/>
+    <p:sldId id="327" r:id="rId16"/>
+    <p:sldId id="328" r:id="rId17"/>
+    <p:sldId id="329" r:id="rId18"/>
   </p:sldIdLst>
   <p:sldSz cx="12188825" cy="6858000"/>
   <p:notesSz cx="6858000" cy="9144000"/>
   <p:custDataLst>
-    <p:tags r:id="rId15"/>
+    <p:tags r:id="rId21"/>
   </p:custDataLst>
   <p:defaultTextStyle>
     <a:defPPr rtl="0">
@@ -142,6 +148,10 @@
 </p:presentation>
 </file>
 
+<file path=ppt/revisionInfo.xml><?xml version="1.0" encoding="utf-8"?>
+<p1510:revInfo xmlns:a="http://schemas.openxmlformats.org/drawingml/2006/main" xmlns:r="http://schemas.openxmlformats.org/officeDocument/2006/relationships" xmlns:p1510="http://schemas.microsoft.com/office/powerpoint/2015/10/main"/>
+</file>
+
 <file path=ppt/handoutMasters/handoutMaster1.xml><?xml version="1.0" encoding="utf-8"?>
 <p:handoutMaster xmlns:a="http://schemas.openxmlformats.org/drawingml/2006/main" xmlns:r="http://schemas.openxmlformats.org/officeDocument/2006/relationships" xmlns:p="http://schemas.openxmlformats.org/presentationml/2006/main">
   <p:cSld>
@@ -226,7 +236,7 @@
             <a:pPr algn="r" rtl="0"/>
             <a:fld id="{4FD0811F-65A0-45DC-A418-D7D88257DA14}" type="datetime1">
               <a:rPr lang="fr-FR" smtClean="0"/>
-              <a:t>11/05/2017</a:t>
+              <a:t>12/05/2017</a:t>
             </a:fld>
             <a:endParaRPr lang="fr-FR" dirty="0"/>
           </a:p>
@@ -295,7 +305,7 @@
             <a:fld id="{D9F912AB-2776-42F2-A957-313FC7EFEDB9}" type="slidenum">
               <a:rPr lang="fr-FR" smtClean="0"/>
               <a:pPr algn="r" rtl="0"/>
-              <a:t>‹N°›</a:t>
+              <a:t>‹#›</a:t>
             </a:fld>
             <a:endParaRPr lang="fr-FR" dirty="0"/>
           </a:p>
@@ -396,7 +406,7 @@
             <a:fld id="{869BCCB5-3197-42F0-A23E-FBF35BB6BD6D}" type="datetime1">
               <a:rPr lang="fr-FR" smtClean="0"/>
               <a:pPr/>
-              <a:t>11/05/2017</a:t>
+              <a:t>12/05/2017</a:t>
             </a:fld>
             <a:endParaRPr lang="fr-FR" dirty="0"/>
           </a:p>
@@ -557,7 +567,7 @@
             <a:fld id="{F93199CD-3E1B-4AE6-990F-76F925F5EA9F}" type="slidenum">
               <a:rPr lang="fr-FR" smtClean="0"/>
               <a:pPr/>
-              <a:t>‹N°›</a:t>
+              <a:t>‹#›</a:t>
             </a:fld>
             <a:endParaRPr lang="fr-FR" dirty="0"/>
           </a:p>
@@ -1002,7 +1012,7 @@
             <a:fld id="{C169FE22-A35D-4AA5-9ED0-CA5AA0D08EE7}" type="datetime1">
               <a:rPr lang="fr-FR" smtClean="0"/>
               <a:pPr/>
-              <a:t>11/05/2017</a:t>
+              <a:t>12/05/2017</a:t>
             </a:fld>
             <a:endParaRPr lang="fr-FR" dirty="0"/>
           </a:p>
@@ -1046,7 +1056,7 @@
             <a:pPr rtl="0"/>
             <a:fld id="{2A013F82-EE5E-44EE-A61D-E31C6657F26F}" type="slidenum">
               <a:rPr lang="fr-FR" noProof="0" smtClean="0"/>
-              <a:t>‹N°›</a:t>
+              <a:t>‹#›</a:t>
             </a:fld>
             <a:endParaRPr lang="fr-FR" noProof="0" dirty="0"/>
           </a:p>
@@ -1202,7 +1212,7 @@
             <a:fld id="{4B2D50EC-F18A-4356-A82F-ED015F56C2C6}" type="datetime1">
               <a:rPr lang="fr-FR" smtClean="0"/>
               <a:pPr/>
-              <a:t>11/05/2017</a:t>
+              <a:t>12/05/2017</a:t>
             </a:fld>
             <a:endParaRPr lang="fr-FR" dirty="0"/>
           </a:p>
@@ -1246,7 +1256,7 @@
             <a:pPr rtl="0"/>
             <a:fld id="{2A013F82-EE5E-44EE-A61D-E31C6657F26F}" type="slidenum">
               <a:rPr lang="fr-FR" noProof="0" smtClean="0"/>
-              <a:t>‹N°›</a:t>
+              <a:t>‹#›</a:t>
             </a:fld>
             <a:endParaRPr lang="fr-FR" noProof="0" dirty="0"/>
           </a:p>
@@ -1399,7 +1409,7 @@
             <a:fld id="{D8AB5196-52B1-4918-B153-34A0C9A4A7AD}" type="datetime1">
               <a:rPr lang="fr-FR" smtClean="0"/>
               <a:pPr/>
-              <a:t>11/05/2017</a:t>
+              <a:t>12/05/2017</a:t>
             </a:fld>
             <a:endParaRPr lang="fr-FR" dirty="0"/>
           </a:p>
@@ -1443,7 +1453,7 @@
             <a:pPr rtl="0"/>
             <a:fld id="{2A013F82-EE5E-44EE-A61D-E31C6657F26F}" type="slidenum">
               <a:rPr lang="fr-FR" noProof="0" smtClean="0"/>
-              <a:t>‹N°›</a:t>
+              <a:t>‹#›</a:t>
             </a:fld>
             <a:endParaRPr lang="fr-FR" noProof="0" dirty="0"/>
           </a:p>
@@ -1687,7 +1697,7 @@
             <a:fld id="{7399499F-CA45-4A76-BC24-F973E24AC3FB}" type="datetime1">
               <a:rPr lang="fr-FR" smtClean="0"/>
               <a:pPr/>
-              <a:t>11/05/2017</a:t>
+              <a:t>12/05/2017</a:t>
             </a:fld>
             <a:endParaRPr lang="fr-FR" dirty="0"/>
           </a:p>
@@ -1731,7 +1741,7 @@
             <a:pPr rtl="0"/>
             <a:fld id="{2A013F82-EE5E-44EE-A61D-E31C6657F26F}" type="slidenum">
               <a:rPr lang="fr-FR" noProof="0" smtClean="0"/>
-              <a:t>‹N°›</a:t>
+              <a:t>‹#›</a:t>
             </a:fld>
             <a:endParaRPr lang="fr-FR" noProof="0" dirty="0"/>
           </a:p>
@@ -1999,7 +2009,7 @@
             <a:fld id="{3817870C-A0A5-4D92-B86D-C2791EFA3A23}" type="datetime1">
               <a:rPr lang="fr-FR" smtClean="0"/>
               <a:pPr/>
-              <a:t>11/05/2017</a:t>
+              <a:t>12/05/2017</a:t>
             </a:fld>
             <a:endParaRPr lang="fr-FR" dirty="0"/>
           </a:p>
@@ -2047,7 +2057,7 @@
             <a:fld id="{2A013F82-EE5E-44EE-A61D-E31C6657F26F}" type="slidenum">
               <a:rPr lang="fr-FR" noProof="0" smtClean="0"/>
               <a:pPr/>
-              <a:t>‹N°›</a:t>
+              <a:t>‹#›</a:t>
             </a:fld>
             <a:endParaRPr lang="fr-FR" noProof="0" dirty="0"/>
           </a:p>
@@ -2467,7 +2477,7 @@
             <a:fld id="{812A7B89-83CE-4355-8D19-9AD5D8179E27}" type="datetime1">
               <a:rPr lang="fr-FR" smtClean="0"/>
               <a:pPr/>
-              <a:t>11/05/2017</a:t>
+              <a:t>12/05/2017</a:t>
             </a:fld>
             <a:endParaRPr lang="fr-FR" dirty="0"/>
           </a:p>
@@ -2515,7 +2525,7 @@
             <a:fld id="{2A013F82-EE5E-44EE-A61D-E31C6657F26F}" type="slidenum">
               <a:rPr lang="fr-FR" noProof="0" smtClean="0"/>
               <a:pPr/>
-              <a:t>‹N°›</a:t>
+              <a:t>‹#›</a:t>
             </a:fld>
             <a:endParaRPr lang="fr-FR" noProof="0" dirty="0"/>
           </a:p>
@@ -2609,7 +2619,7 @@
             <a:fld id="{EA4593A4-CD22-4D89-9631-B432485C88BE}" type="datetime1">
               <a:rPr lang="fr-FR" smtClean="0"/>
               <a:pPr/>
-              <a:t>11/05/2017</a:t>
+              <a:t>12/05/2017</a:t>
             </a:fld>
             <a:endParaRPr lang="fr-FR" dirty="0"/>
           </a:p>
@@ -2653,7 +2663,7 @@
             <a:pPr rtl="0"/>
             <a:fld id="{2A013F82-EE5E-44EE-A61D-E31C6657F26F}" type="slidenum">
               <a:rPr lang="fr-FR" noProof="0" smtClean="0"/>
-              <a:t>‹N°›</a:t>
+              <a:t>‹#›</a:t>
             </a:fld>
             <a:endParaRPr lang="fr-FR" noProof="0" dirty="0"/>
           </a:p>
@@ -2731,7 +2741,7 @@
             <a:fld id="{88F3045D-8AE6-4E47-932F-47FA387FEA34}" type="datetime1">
               <a:rPr lang="fr-FR" smtClean="0"/>
               <a:pPr/>
-              <a:t>11/05/2017</a:t>
+              <a:t>12/05/2017</a:t>
             </a:fld>
             <a:endParaRPr lang="fr-FR" dirty="0"/>
           </a:p>
@@ -2775,7 +2785,7 @@
             <a:pPr rtl="0"/>
             <a:fld id="{2A013F82-EE5E-44EE-A61D-E31C6657F26F}" type="slidenum">
               <a:rPr lang="fr-FR" noProof="0" smtClean="0"/>
-              <a:t>‹N°›</a:t>
+              <a:t>‹#›</a:t>
             </a:fld>
             <a:endParaRPr lang="fr-FR" noProof="0" dirty="0"/>
           </a:p>
@@ -3061,7 +3071,7 @@
             <a:fld id="{2282C9DA-93FE-4DDE-8920-2C8AB1F5E18A}" type="datetime1">
               <a:rPr lang="fr-FR" smtClean="0"/>
               <a:pPr/>
-              <a:t>11/05/2017</a:t>
+              <a:t>12/05/2017</a:t>
             </a:fld>
             <a:endParaRPr lang="fr-FR" dirty="0"/>
           </a:p>
@@ -3105,7 +3115,7 @@
             <a:pPr rtl="0"/>
             <a:fld id="{2A013F82-EE5E-44EE-A61D-E31C6657F26F}" type="slidenum">
               <a:rPr lang="fr-FR" noProof="0" smtClean="0"/>
-              <a:t>‹N°›</a:t>
+              <a:t>‹#›</a:t>
             </a:fld>
             <a:endParaRPr lang="fr-FR" noProof="0" dirty="0"/>
           </a:p>
@@ -3381,7 +3391,7 @@
             <a:fld id="{EB002A6A-F78C-474F-BA6B-17AE42EC613D}" type="datetime1">
               <a:rPr lang="fr-FR" smtClean="0"/>
               <a:pPr/>
-              <a:t>11/05/2017</a:t>
+              <a:t>12/05/2017</a:t>
             </a:fld>
             <a:endParaRPr lang="fr-FR" dirty="0"/>
           </a:p>
@@ -3426,7 +3436,7 @@
             <a:fld id="{2A013F82-EE5E-44EE-A61D-E31C6657F26F}" type="slidenum">
               <a:rPr lang="fr-FR" noProof="0" smtClean="0"/>
               <a:pPr rtl="0"/>
-              <a:t>‹N°›</a:t>
+              <a:t>‹#›</a:t>
             </a:fld>
             <a:endParaRPr lang="fr-FR" noProof="0" dirty="0"/>
           </a:p>
@@ -3618,7 +3628,7 @@
             <a:fld id="{B1406553-4B01-4903-B663-70E503E45D52}" type="datetime1">
               <a:rPr lang="fr-FR" smtClean="0"/>
               <a:pPr/>
-              <a:t>11/05/2017</a:t>
+              <a:t>12/05/2017</a:t>
             </a:fld>
             <a:endParaRPr lang="fr-FR" dirty="0"/>
           </a:p>
@@ -3698,7 +3708,7 @@
             <a:fld id="{2A013F82-EE5E-44EE-A61D-E31C6657F26F}" type="slidenum">
               <a:rPr lang="fr-FR" smtClean="0"/>
               <a:pPr/>
-              <a:t>‹N°›</a:t>
+              <a:t>‹#›</a:t>
             </a:fld>
             <a:endParaRPr lang="fr-FR" dirty="0"/>
           </a:p>
@@ -4150,6 +4160,535 @@
 </p:sld>
 </file>
 
+<file path=ppt/slides/slide10.xml><?xml version="1.0" encoding="utf-8"?>
+<p:sld xmlns:a="http://schemas.openxmlformats.org/drawingml/2006/main" xmlns:r="http://schemas.openxmlformats.org/officeDocument/2006/relationships" xmlns:p="http://schemas.openxmlformats.org/presentationml/2006/main">
+  <p:cSld>
+    <p:spTree>
+      <p:nvGrpSpPr>
+        <p:cNvPr id="1" name=""/>
+        <p:cNvGrpSpPr/>
+        <p:nvPr/>
+      </p:nvGrpSpPr>
+      <p:grpSpPr>
+        <a:xfrm>
+          <a:off x="0" y="0"/>
+          <a:ext cx="0" cy="0"/>
+          <a:chOff x="0" y="0"/>
+          <a:chExt cx="0" cy="0"/>
+        </a:xfrm>
+      </p:grpSpPr>
+      <p:sp>
+        <p:nvSpPr>
+          <p:cNvPr id="2" name="Title 1"/>
+          <p:cNvSpPr>
+            <a:spLocks noGrp="1"/>
+          </p:cNvSpPr>
+          <p:nvPr>
+            <p:ph type="title"/>
+          </p:nvPr>
+        </p:nvSpPr>
+        <p:spPr/>
+        <p:txBody>
+          <a:bodyPr/>
+          <a:lstStyle/>
+          <a:p>
+            <a:pPr algn="ctr"/>
+            <a:r>
+              <a:rPr lang="fr-FR" dirty="0" err="1"/>
+              <a:t>Specificities</a:t>
+            </a:r>
+            <a:r>
+              <a:rPr lang="fr-FR" dirty="0"/>
+              <a:t> of the ZK</a:t>
+            </a:r>
+            <a:br>
+              <a:rPr lang="fr-FR" dirty="0"/>
+            </a:br>
+            <a:endParaRPr lang="en-US" dirty="0"/>
+          </a:p>
+        </p:txBody>
+      </p:sp>
+      <p:sp>
+        <p:nvSpPr>
+          <p:cNvPr id="3" name="Content Placeholder 2"/>
+          <p:cNvSpPr>
+            <a:spLocks noGrp="1"/>
+          </p:cNvSpPr>
+          <p:nvPr>
+            <p:ph sz="half" idx="1"/>
+          </p:nvPr>
+        </p:nvSpPr>
+        <p:spPr/>
+        <p:txBody>
+          <a:bodyPr/>
+          <a:lstStyle/>
+          <a:p>
+            <a:endParaRPr lang="en-US"/>
+          </a:p>
+        </p:txBody>
+      </p:sp>
+      <p:sp>
+        <p:nvSpPr>
+          <p:cNvPr id="4" name="Content Placeholder 3"/>
+          <p:cNvSpPr>
+            <a:spLocks noGrp="1"/>
+          </p:cNvSpPr>
+          <p:nvPr>
+            <p:ph sz="half" idx="2"/>
+          </p:nvPr>
+        </p:nvSpPr>
+        <p:spPr/>
+        <p:txBody>
+          <a:bodyPr/>
+          <a:lstStyle/>
+          <a:p>
+            <a:endParaRPr lang="en-US"/>
+          </a:p>
+        </p:txBody>
+      </p:sp>
+    </p:spTree>
+    <p:extLst>
+      <p:ext uri="{BB962C8B-B14F-4D97-AF65-F5344CB8AC3E}">
+        <p14:creationId xmlns:p14="http://schemas.microsoft.com/office/powerpoint/2010/main" val="1019977215"/>
+      </p:ext>
+    </p:extLst>
+  </p:cSld>
+  <p:clrMapOvr>
+    <a:masterClrMapping/>
+  </p:clrMapOvr>
+  <mc:AlternateContent xmlns:mc="http://schemas.openxmlformats.org/markup-compatibility/2006" xmlns:p14="http://schemas.microsoft.com/office/powerpoint/2010/main">
+    <mc:Choice Requires="p14">
+      <p:transition spd="med" p14:dur="700">
+        <p:fade/>
+      </p:transition>
+    </mc:Choice>
+    <mc:Fallback xmlns="">
+      <p:transition spd="med">
+        <p:fade/>
+      </p:transition>
+    </mc:Fallback>
+  </mc:AlternateContent>
+</p:sld>
+</file>
+
+<file path=ppt/slides/slide11.xml><?xml version="1.0" encoding="utf-8"?>
+<p:sld xmlns:a="http://schemas.openxmlformats.org/drawingml/2006/main" xmlns:r="http://schemas.openxmlformats.org/officeDocument/2006/relationships" xmlns:p="http://schemas.openxmlformats.org/presentationml/2006/main">
+  <p:cSld>
+    <p:spTree>
+      <p:nvGrpSpPr>
+        <p:cNvPr id="1" name=""/>
+        <p:cNvGrpSpPr/>
+        <p:nvPr/>
+      </p:nvGrpSpPr>
+      <p:grpSpPr>
+        <a:xfrm>
+          <a:off x="0" y="0"/>
+          <a:ext cx="0" cy="0"/>
+          <a:chOff x="0" y="0"/>
+          <a:chExt cx="0" cy="0"/>
+        </a:xfrm>
+      </p:grpSpPr>
+      <p:sp>
+        <p:nvSpPr>
+          <p:cNvPr id="2" name="Title 1"/>
+          <p:cNvSpPr>
+            <a:spLocks noGrp="1"/>
+          </p:cNvSpPr>
+          <p:nvPr>
+            <p:ph type="title"/>
+          </p:nvPr>
+        </p:nvSpPr>
+        <p:spPr/>
+        <p:txBody>
+          <a:bodyPr/>
+          <a:lstStyle/>
+          <a:p>
+            <a:pPr algn="ctr"/>
+            <a:r>
+              <a:rPr lang="fr-FR" dirty="0"/>
+              <a:t>Application to Online </a:t>
+            </a:r>
+            <a:r>
+              <a:rPr lang="fr-FR" dirty="0" err="1"/>
+              <a:t>Voting</a:t>
+            </a:r>
+            <a:br>
+              <a:rPr lang="fr-FR" dirty="0"/>
+            </a:br>
+            <a:endParaRPr lang="en-US" dirty="0"/>
+          </a:p>
+        </p:txBody>
+      </p:sp>
+      <p:sp>
+        <p:nvSpPr>
+          <p:cNvPr id="3" name="Content Placeholder 2"/>
+          <p:cNvSpPr>
+            <a:spLocks noGrp="1"/>
+          </p:cNvSpPr>
+          <p:nvPr>
+            <p:ph sz="half" idx="1"/>
+          </p:nvPr>
+        </p:nvSpPr>
+        <p:spPr>
+          <a:xfrm>
+            <a:off x="1504781" y="1905001"/>
+            <a:ext cx="8910111" cy="4114800"/>
+          </a:xfrm>
+        </p:spPr>
+        <p:txBody>
+          <a:bodyPr/>
+          <a:lstStyle/>
+          <a:p>
+            <a:r>
+              <a:rPr lang="en-US" dirty="0"/>
+              <a:t>Server represents the organization/government</a:t>
+            </a:r>
+          </a:p>
+          <a:p>
+            <a:r>
+              <a:rPr lang="en-US" dirty="0"/>
+              <a:t>Client is the voter</a:t>
+            </a:r>
+          </a:p>
+          <a:p>
+            <a:pPr marL="0" indent="0">
+              <a:buNone/>
+            </a:pPr>
+            <a:endParaRPr lang="en-US" dirty="0"/>
+          </a:p>
+          <a:p>
+            <a:r>
+              <a:rPr lang="en-US" dirty="0"/>
+              <a:t>The application of ZKP allows a voter to:</a:t>
+            </a:r>
+          </a:p>
+          <a:p>
+            <a:pPr lvl="1"/>
+            <a:r>
+              <a:rPr lang="en-US" dirty="0"/>
+              <a:t>Register as a voter in the first place</a:t>
+            </a:r>
+          </a:p>
+          <a:p>
+            <a:pPr lvl="1"/>
+            <a:r>
+              <a:rPr lang="en-US" dirty="0"/>
+              <a:t>With credentials, prove that the voter is who they say they are</a:t>
+            </a:r>
+          </a:p>
+          <a:p>
+            <a:pPr lvl="1"/>
+            <a:r>
+              <a:rPr lang="en-US" dirty="0"/>
+              <a:t>Protects voters by keeping their credentials from being sent over a network</a:t>
+            </a:r>
+          </a:p>
+          <a:p>
+            <a:pPr lvl="1"/>
+            <a:r>
+              <a:rPr lang="en-US" dirty="0"/>
+              <a:t>Once authenticated the user can then communicate with the organization</a:t>
+            </a:r>
+          </a:p>
+        </p:txBody>
+      </p:sp>
+    </p:spTree>
+    <p:extLst>
+      <p:ext uri="{BB962C8B-B14F-4D97-AF65-F5344CB8AC3E}">
+        <p14:creationId xmlns:p14="http://schemas.microsoft.com/office/powerpoint/2010/main" val="3399109874"/>
+      </p:ext>
+    </p:extLst>
+  </p:cSld>
+  <p:clrMapOvr>
+    <a:masterClrMapping/>
+  </p:clrMapOvr>
+  <mc:AlternateContent xmlns:mc="http://schemas.openxmlformats.org/markup-compatibility/2006" xmlns:p14="http://schemas.microsoft.com/office/powerpoint/2010/main">
+    <mc:Choice Requires="p14">
+      <p:transition spd="med" p14:dur="700">
+        <p:fade/>
+      </p:transition>
+    </mc:Choice>
+    <mc:Fallback xmlns="">
+      <p:transition spd="med">
+        <p:fade/>
+      </p:transition>
+    </mc:Fallback>
+  </mc:AlternateContent>
+</p:sld>
+</file>
+
+<file path=ppt/slides/slide12.xml><?xml version="1.0" encoding="utf-8"?>
+<p:sld xmlns:a="http://schemas.openxmlformats.org/drawingml/2006/main" xmlns:r="http://schemas.openxmlformats.org/officeDocument/2006/relationships" xmlns:p="http://schemas.openxmlformats.org/presentationml/2006/main">
+  <p:cSld>
+    <p:spTree>
+      <p:nvGrpSpPr>
+        <p:cNvPr id="1" name=""/>
+        <p:cNvGrpSpPr/>
+        <p:nvPr/>
+      </p:nvGrpSpPr>
+      <p:grpSpPr>
+        <a:xfrm>
+          <a:off x="0" y="0"/>
+          <a:ext cx="0" cy="0"/>
+          <a:chOff x="0" y="0"/>
+          <a:chExt cx="0" cy="0"/>
+        </a:xfrm>
+      </p:grpSpPr>
+      <p:sp>
+        <p:nvSpPr>
+          <p:cNvPr id="2" name="Title 1"/>
+          <p:cNvSpPr>
+            <a:spLocks noGrp="1"/>
+          </p:cNvSpPr>
+          <p:nvPr>
+            <p:ph type="title"/>
+          </p:nvPr>
+        </p:nvSpPr>
+        <p:spPr>
+          <a:xfrm>
+            <a:off x="1269876" y="2132856"/>
+            <a:ext cx="9144001" cy="1371600"/>
+          </a:xfrm>
+        </p:spPr>
+        <p:txBody>
+          <a:bodyPr/>
+          <a:lstStyle/>
+          <a:p>
+            <a:pPr algn="ctr"/>
+            <a:r>
+              <a:rPr lang="en-US" dirty="0"/>
+              <a:t>Demonstration</a:t>
+            </a:r>
+          </a:p>
+        </p:txBody>
+      </p:sp>
+    </p:spTree>
+    <p:extLst>
+      <p:ext uri="{BB962C8B-B14F-4D97-AF65-F5344CB8AC3E}">
+        <p14:creationId xmlns:p14="http://schemas.microsoft.com/office/powerpoint/2010/main" val="2921157559"/>
+      </p:ext>
+    </p:extLst>
+  </p:cSld>
+  <p:clrMapOvr>
+    <a:masterClrMapping/>
+  </p:clrMapOvr>
+  <mc:AlternateContent xmlns:mc="http://schemas.openxmlformats.org/markup-compatibility/2006" xmlns:p14="http://schemas.microsoft.com/office/powerpoint/2010/main">
+    <mc:Choice Requires="p14">
+      <p:transition spd="med" p14:dur="700">
+        <p:fade/>
+      </p:transition>
+    </mc:Choice>
+    <mc:Fallback xmlns="">
+      <p:transition spd="med">
+        <p:fade/>
+      </p:transition>
+    </mc:Fallback>
+  </mc:AlternateContent>
+</p:sld>
+</file>
+
+<file path=ppt/slides/slide13.xml><?xml version="1.0" encoding="utf-8"?>
+<p:sld xmlns:a="http://schemas.openxmlformats.org/drawingml/2006/main" xmlns:r="http://schemas.openxmlformats.org/officeDocument/2006/relationships" xmlns:p="http://schemas.openxmlformats.org/presentationml/2006/main">
+  <p:cSld>
+    <p:spTree>
+      <p:nvGrpSpPr>
+        <p:cNvPr id="1" name=""/>
+        <p:cNvGrpSpPr/>
+        <p:nvPr/>
+      </p:nvGrpSpPr>
+      <p:grpSpPr>
+        <a:xfrm>
+          <a:off x="0" y="0"/>
+          <a:ext cx="0" cy="0"/>
+          <a:chOff x="0" y="0"/>
+          <a:chExt cx="0" cy="0"/>
+        </a:xfrm>
+      </p:grpSpPr>
+      <p:sp>
+        <p:nvSpPr>
+          <p:cNvPr id="2" name="Title 1"/>
+          <p:cNvSpPr>
+            <a:spLocks noGrp="1"/>
+          </p:cNvSpPr>
+          <p:nvPr>
+            <p:ph type="title"/>
+          </p:nvPr>
+        </p:nvSpPr>
+        <p:spPr/>
+        <p:txBody>
+          <a:bodyPr/>
+          <a:lstStyle/>
+          <a:p>
+            <a:pPr algn="ctr"/>
+            <a:r>
+              <a:rPr lang="en-US" dirty="0"/>
+              <a:t>Problems Encountered</a:t>
+            </a:r>
+          </a:p>
+        </p:txBody>
+      </p:sp>
+      <p:sp>
+        <p:nvSpPr>
+          <p:cNvPr id="3" name="Content Placeholder 2"/>
+          <p:cNvSpPr>
+            <a:spLocks noGrp="1"/>
+          </p:cNvSpPr>
+          <p:nvPr>
+            <p:ph sz="half" idx="1"/>
+          </p:nvPr>
+        </p:nvSpPr>
+        <p:spPr>
+          <a:xfrm>
+            <a:off x="1504781" y="1905001"/>
+            <a:ext cx="8982119" cy="4114800"/>
+          </a:xfrm>
+        </p:spPr>
+        <p:txBody>
+          <a:bodyPr/>
+          <a:lstStyle/>
+          <a:p>
+            <a:endParaRPr lang="en-US" dirty="0"/>
+          </a:p>
+          <a:p>
+            <a:r>
+              <a:rPr lang="en-US" dirty="0"/>
+              <a:t>Calculations taking too long for a useful application due to:</a:t>
+            </a:r>
+          </a:p>
+          <a:p>
+            <a:pPr lvl="1"/>
+            <a:r>
+              <a:rPr lang="en-US" dirty="0"/>
+              <a:t>Hashed password size</a:t>
+            </a:r>
+          </a:p>
+          <a:p>
+            <a:pPr lvl="1"/>
+            <a:r>
+              <a:rPr lang="en-US" dirty="0"/>
+              <a:t>Slow exponentiation</a:t>
+            </a:r>
+          </a:p>
+          <a:p>
+            <a:pPr marL="231775" lvl="1" indent="0">
+              <a:buNone/>
+            </a:pPr>
+            <a:endParaRPr lang="en-US" dirty="0"/>
+          </a:p>
+          <a:p>
+            <a:r>
+              <a:rPr lang="en-US" dirty="0"/>
+              <a:t>Knowing when </a:t>
+            </a:r>
+            <a:r>
+              <a:rPr lang="en-US" dirty="0" err="1"/>
+              <a:t>moding</a:t>
+            </a:r>
+            <a:r>
+              <a:rPr lang="en-US" dirty="0"/>
+              <a:t> was appropriate and secure</a:t>
+            </a:r>
+          </a:p>
+          <a:p>
+            <a:endParaRPr lang="en-US" dirty="0"/>
+          </a:p>
+        </p:txBody>
+      </p:sp>
+    </p:spTree>
+    <p:extLst>
+      <p:ext uri="{BB962C8B-B14F-4D97-AF65-F5344CB8AC3E}">
+        <p14:creationId xmlns:p14="http://schemas.microsoft.com/office/powerpoint/2010/main" val="509639969"/>
+      </p:ext>
+    </p:extLst>
+  </p:cSld>
+  <p:clrMapOvr>
+    <a:masterClrMapping/>
+  </p:clrMapOvr>
+  <mc:AlternateContent xmlns:mc="http://schemas.openxmlformats.org/markup-compatibility/2006" xmlns:p14="http://schemas.microsoft.com/office/powerpoint/2010/main">
+    <mc:Choice Requires="p14">
+      <p:transition spd="med" p14:dur="700">
+        <p:fade/>
+      </p:transition>
+    </mc:Choice>
+    <mc:Fallback xmlns="">
+      <p:transition spd="med">
+        <p:fade/>
+      </p:transition>
+    </mc:Fallback>
+  </mc:AlternateContent>
+</p:sld>
+</file>
+
+<file path=ppt/slides/slide14.xml><?xml version="1.0" encoding="utf-8"?>
+<p:sld xmlns:a="http://schemas.openxmlformats.org/drawingml/2006/main" xmlns:r="http://schemas.openxmlformats.org/officeDocument/2006/relationships" xmlns:p="http://schemas.openxmlformats.org/presentationml/2006/main">
+  <p:cSld>
+    <p:spTree>
+      <p:nvGrpSpPr>
+        <p:cNvPr id="1" name=""/>
+        <p:cNvGrpSpPr/>
+        <p:nvPr/>
+      </p:nvGrpSpPr>
+      <p:grpSpPr>
+        <a:xfrm>
+          <a:off x="0" y="0"/>
+          <a:ext cx="0" cy="0"/>
+          <a:chOff x="0" y="0"/>
+          <a:chExt cx="0" cy="0"/>
+        </a:xfrm>
+      </p:grpSpPr>
+      <p:sp>
+        <p:nvSpPr>
+          <p:cNvPr id="2" name="Title 1"/>
+          <p:cNvSpPr>
+            <a:spLocks noGrp="1"/>
+          </p:cNvSpPr>
+          <p:nvPr>
+            <p:ph type="title"/>
+          </p:nvPr>
+        </p:nvSpPr>
+        <p:spPr>
+          <a:xfrm>
+            <a:off x="1485900" y="2420888"/>
+            <a:ext cx="9144001" cy="1371600"/>
+          </a:xfrm>
+        </p:spPr>
+        <p:txBody>
+          <a:bodyPr/>
+          <a:lstStyle/>
+          <a:p>
+            <a:pPr algn="ctr"/>
+            <a:r>
+              <a:rPr lang="en-US" dirty="0"/>
+              <a:t>Now lets dig into the code!</a:t>
+            </a:r>
+          </a:p>
+        </p:txBody>
+      </p:sp>
+    </p:spTree>
+    <p:extLst>
+      <p:ext uri="{BB962C8B-B14F-4D97-AF65-F5344CB8AC3E}">
+        <p14:creationId xmlns:p14="http://schemas.microsoft.com/office/powerpoint/2010/main" val="1663193031"/>
+      </p:ext>
+    </p:extLst>
+  </p:cSld>
+  <p:clrMapOvr>
+    <a:masterClrMapping/>
+  </p:clrMapOvr>
+  <mc:AlternateContent xmlns:mc="http://schemas.openxmlformats.org/markup-compatibility/2006" xmlns:p14="http://schemas.microsoft.com/office/powerpoint/2010/main">
+    <mc:Choice Requires="p14">
+      <p:transition spd="med" p14:dur="700">
+        <p:fade/>
+      </p:transition>
+    </mc:Choice>
+    <mc:Fallback xmlns="">
+      <p:transition spd="med">
+        <p:fade/>
+      </p:transition>
+    </mc:Fallback>
+  </mc:AlternateContent>
+</p:sld>
+</file>
+
 <file path=ppt/slides/slide2.xml><?xml version="1.0" encoding="utf-8"?>
 <p:sld xmlns:a="http://schemas.openxmlformats.org/drawingml/2006/main" xmlns:r="http://schemas.openxmlformats.org/officeDocument/2006/relationships" xmlns:p="http://schemas.openxmlformats.org/presentationml/2006/main">
   <p:cSld>
@@ -4254,6 +4793,18 @@
               <a:rPr lang="fr-FR" dirty="0"/>
               <a:t> of the ZK</a:t>
             </a:r>
+          </a:p>
+          <a:p>
+            <a:pPr rtl="0"/>
+            <a:r>
+              <a:rPr lang="fr-FR" dirty="0"/>
+              <a:t>Application to Online </a:t>
+            </a:r>
+            <a:r>
+              <a:rPr lang="fr-FR" dirty="0" err="1"/>
+              <a:t>Voting</a:t>
+            </a:r>
+            <a:endParaRPr lang="fr-FR" dirty="0"/>
           </a:p>
           <a:p>
             <a:pPr rtl="0"/>
@@ -4930,7 +5481,7 @@
       </p:grpSpPr>
       <p:sp>
         <p:nvSpPr>
-          <p:cNvPr id="2" name="Titre 1"/>
+          <p:cNvPr id="2" name="Title 1"/>
           <p:cNvSpPr>
             <a:spLocks noGrp="1"/>
           </p:cNvSpPr>
@@ -4944,6 +5495,492 @@
           <a:lstStyle/>
           <a:p>
             <a:r>
+              <a:rPr lang="en-US" dirty="0"/>
+              <a:t>The cave example</a:t>
+            </a:r>
+          </a:p>
+        </p:txBody>
+      </p:sp>
+      <p:sp>
+        <p:nvSpPr>
+          <p:cNvPr id="3" name="Content Placeholder 2"/>
+          <p:cNvSpPr>
+            <a:spLocks noGrp="1"/>
+          </p:cNvSpPr>
+          <p:nvPr>
+            <p:ph sz="half" idx="1"/>
+          </p:nvPr>
+        </p:nvSpPr>
+        <p:spPr/>
+        <p:txBody>
+          <a:bodyPr/>
+          <a:lstStyle/>
+          <a:p>
+            <a:pPr marL="0" indent="0">
+              <a:buNone/>
+            </a:pPr>
+            <a:endParaRPr lang="en-US" dirty="0"/>
+          </a:p>
+          <a:p>
+            <a:r>
+              <a:rPr lang="en-US" dirty="0"/>
+              <a:t>Repeat many times to make the probability of guessing the right answer negligible.</a:t>
+            </a:r>
+          </a:p>
+          <a:p>
+            <a:r>
+              <a:rPr lang="en-US" dirty="0"/>
+              <a:t>(1/2)^1000 =</a:t>
+            </a:r>
+          </a:p>
+          <a:p>
+            <a:pPr marL="0" indent="0">
+              <a:buNone/>
+            </a:pPr>
+            <a:r>
+              <a:rPr lang="en-US" dirty="0"/>
+              <a:t>   really </a:t>
+            </a:r>
+            <a:r>
+              <a:rPr lang="en-US" dirty="0" err="1"/>
+              <a:t>really</a:t>
+            </a:r>
+            <a:r>
+              <a:rPr lang="en-US" dirty="0"/>
+              <a:t> small probability</a:t>
+            </a:r>
+          </a:p>
+        </p:txBody>
+      </p:sp>
+      <p:pic>
+        <p:nvPicPr>
+          <p:cNvPr id="5" name="Picture 2" descr="https://upload.wikimedia.org/wikipedia/commons/a/a1/Zkip_alibaba3.png"/>
+          <p:cNvPicPr>
+            <a:picLocks noGrp="1" noChangeAspect="1" noChangeArrowheads="1"/>
+          </p:cNvPicPr>
+          <p:nvPr>
+            <p:ph sz="half" idx="2"/>
+          </p:nvPr>
+        </p:nvPicPr>
+        <p:blipFill>
+          <a:blip r:embed="rId2" cstate="print">
+            <a:extLst>
+              <a:ext uri="{28A0092B-C50C-407E-A947-70E740481C1C}">
+                <a14:useLocalDpi xmlns:a14="http://schemas.microsoft.com/office/drawing/2010/main" val="0"/>
+              </a:ext>
+            </a:extLst>
+          </a:blip>
+          <a:srcRect/>
+          <a:stretch>
+            <a:fillRect/>
+          </a:stretch>
+        </p:blipFill>
+        <p:spPr bwMode="auto">
+          <a:xfrm>
+            <a:off x="6454452" y="2006712"/>
+            <a:ext cx="1464511" cy="1189640"/>
+          </a:xfrm>
+          <a:prstGeom prst="rect">
+            <a:avLst/>
+          </a:prstGeom>
+          <a:noFill/>
+          <a:extLst>
+            <a:ext uri="{909E8E84-426E-40DD-AFC4-6F175D3DCCD1}">
+              <a14:hiddenFill xmlns:a14="http://schemas.microsoft.com/office/drawing/2010/main">
+                <a:solidFill>
+                  <a:srgbClr val="FFFFFF"/>
+                </a:solidFill>
+              </a14:hiddenFill>
+            </a:ext>
+          </a:extLst>
+        </p:spPr>
+      </p:pic>
+      <p:pic>
+        <p:nvPicPr>
+          <p:cNvPr id="6" name="Picture 2" descr="https://upload.wikimedia.org/wikipedia/commons/a/a1/Zkip_alibaba3.png"/>
+          <p:cNvPicPr>
+            <a:picLocks noChangeAspect="1" noChangeArrowheads="1"/>
+          </p:cNvPicPr>
+          <p:nvPr/>
+        </p:nvPicPr>
+        <p:blipFill>
+          <a:blip r:embed="rId2" cstate="print">
+            <a:extLst>
+              <a:ext uri="{28A0092B-C50C-407E-A947-70E740481C1C}">
+                <a14:useLocalDpi xmlns:a14="http://schemas.microsoft.com/office/drawing/2010/main" val="0"/>
+              </a:ext>
+            </a:extLst>
+          </a:blip>
+          <a:srcRect/>
+          <a:stretch>
+            <a:fillRect/>
+          </a:stretch>
+        </p:blipFill>
+        <p:spPr bwMode="auto">
+          <a:xfrm>
+            <a:off x="6621774" y="3219373"/>
+            <a:ext cx="1464511" cy="1189640"/>
+          </a:xfrm>
+          <a:prstGeom prst="rect">
+            <a:avLst/>
+          </a:prstGeom>
+          <a:noFill/>
+          <a:extLst>
+            <a:ext uri="{909E8E84-426E-40DD-AFC4-6F175D3DCCD1}">
+              <a14:hiddenFill xmlns:a14="http://schemas.microsoft.com/office/drawing/2010/main">
+                <a:solidFill>
+                  <a:srgbClr val="FFFFFF"/>
+                </a:solidFill>
+              </a14:hiddenFill>
+            </a:ext>
+          </a:extLst>
+        </p:spPr>
+      </p:pic>
+      <p:pic>
+        <p:nvPicPr>
+          <p:cNvPr id="7" name="Picture 2" descr="https://upload.wikimedia.org/wikipedia/commons/a/a1/Zkip_alibaba3.png"/>
+          <p:cNvPicPr>
+            <a:picLocks noChangeAspect="1" noChangeArrowheads="1"/>
+          </p:cNvPicPr>
+          <p:nvPr/>
+        </p:nvPicPr>
+        <p:blipFill>
+          <a:blip r:embed="rId2" cstate="print">
+            <a:extLst>
+              <a:ext uri="{28A0092B-C50C-407E-A947-70E740481C1C}">
+                <a14:useLocalDpi xmlns:a14="http://schemas.microsoft.com/office/drawing/2010/main" val="0"/>
+              </a:ext>
+            </a:extLst>
+          </a:blip>
+          <a:srcRect/>
+          <a:stretch>
+            <a:fillRect/>
+          </a:stretch>
+        </p:blipFill>
+        <p:spPr bwMode="auto">
+          <a:xfrm>
+            <a:off x="8086285" y="2006712"/>
+            <a:ext cx="1464511" cy="1189640"/>
+          </a:xfrm>
+          <a:prstGeom prst="rect">
+            <a:avLst/>
+          </a:prstGeom>
+          <a:noFill/>
+          <a:extLst>
+            <a:ext uri="{909E8E84-426E-40DD-AFC4-6F175D3DCCD1}">
+              <a14:hiddenFill xmlns:a14="http://schemas.microsoft.com/office/drawing/2010/main">
+                <a:solidFill>
+                  <a:srgbClr val="FFFFFF"/>
+                </a:solidFill>
+              </a14:hiddenFill>
+            </a:ext>
+          </a:extLst>
+        </p:spPr>
+      </p:pic>
+      <p:pic>
+        <p:nvPicPr>
+          <p:cNvPr id="8" name="Picture 2" descr="https://upload.wikimedia.org/wikipedia/commons/a/a1/Zkip_alibaba3.png"/>
+          <p:cNvPicPr>
+            <a:picLocks noChangeAspect="1" noChangeArrowheads="1"/>
+          </p:cNvPicPr>
+          <p:nvPr/>
+        </p:nvPicPr>
+        <p:blipFill>
+          <a:blip r:embed="rId2" cstate="print">
+            <a:extLst>
+              <a:ext uri="{28A0092B-C50C-407E-A947-70E740481C1C}">
+                <a14:useLocalDpi xmlns:a14="http://schemas.microsoft.com/office/drawing/2010/main" val="0"/>
+              </a:ext>
+            </a:extLst>
+          </a:blip>
+          <a:srcRect/>
+          <a:stretch>
+            <a:fillRect/>
+          </a:stretch>
+        </p:blipFill>
+        <p:spPr bwMode="auto">
+          <a:xfrm>
+            <a:off x="8125419" y="3247122"/>
+            <a:ext cx="1464511" cy="1189640"/>
+          </a:xfrm>
+          <a:prstGeom prst="rect">
+            <a:avLst/>
+          </a:prstGeom>
+          <a:noFill/>
+          <a:extLst>
+            <a:ext uri="{909E8E84-426E-40DD-AFC4-6F175D3DCCD1}">
+              <a14:hiddenFill xmlns:a14="http://schemas.microsoft.com/office/drawing/2010/main">
+                <a:solidFill>
+                  <a:srgbClr val="FFFFFF"/>
+                </a:solidFill>
+              </a14:hiddenFill>
+            </a:ext>
+          </a:extLst>
+        </p:spPr>
+      </p:pic>
+      <p:pic>
+        <p:nvPicPr>
+          <p:cNvPr id="9" name="Picture 2" descr="https://upload.wikimedia.org/wikipedia/commons/a/a1/Zkip_alibaba3.png"/>
+          <p:cNvPicPr>
+            <a:picLocks noChangeAspect="1" noChangeArrowheads="1"/>
+          </p:cNvPicPr>
+          <p:nvPr/>
+        </p:nvPicPr>
+        <p:blipFill>
+          <a:blip r:embed="rId2" cstate="print">
+            <a:extLst>
+              <a:ext uri="{28A0092B-C50C-407E-A947-70E740481C1C}">
+                <a14:useLocalDpi xmlns:a14="http://schemas.microsoft.com/office/drawing/2010/main" val="0"/>
+              </a:ext>
+            </a:extLst>
+          </a:blip>
+          <a:srcRect/>
+          <a:stretch>
+            <a:fillRect/>
+          </a:stretch>
+        </p:blipFill>
+        <p:spPr bwMode="auto">
+          <a:xfrm>
+            <a:off x="9576618" y="3219373"/>
+            <a:ext cx="1464511" cy="1189640"/>
+          </a:xfrm>
+          <a:prstGeom prst="rect">
+            <a:avLst/>
+          </a:prstGeom>
+          <a:noFill/>
+          <a:extLst>
+            <a:ext uri="{909E8E84-426E-40DD-AFC4-6F175D3DCCD1}">
+              <a14:hiddenFill xmlns:a14="http://schemas.microsoft.com/office/drawing/2010/main">
+                <a:solidFill>
+                  <a:srgbClr val="FFFFFF"/>
+                </a:solidFill>
+              </a14:hiddenFill>
+            </a:ext>
+          </a:extLst>
+        </p:spPr>
+      </p:pic>
+      <p:pic>
+        <p:nvPicPr>
+          <p:cNvPr id="10" name="Picture 2" descr="https://upload.wikimedia.org/wikipedia/commons/a/a1/Zkip_alibaba3.png"/>
+          <p:cNvPicPr>
+            <a:picLocks noChangeAspect="1" noChangeArrowheads="1"/>
+          </p:cNvPicPr>
+          <p:nvPr/>
+        </p:nvPicPr>
+        <p:blipFill>
+          <a:blip r:embed="rId2" cstate="print">
+            <a:extLst>
+              <a:ext uri="{28A0092B-C50C-407E-A947-70E740481C1C}">
+                <a14:useLocalDpi xmlns:a14="http://schemas.microsoft.com/office/drawing/2010/main" val="0"/>
+              </a:ext>
+            </a:extLst>
+          </a:blip>
+          <a:srcRect/>
+          <a:stretch>
+            <a:fillRect/>
+          </a:stretch>
+        </p:blipFill>
+        <p:spPr bwMode="auto">
+          <a:xfrm>
+            <a:off x="9550796" y="2029733"/>
+            <a:ext cx="1464511" cy="1189640"/>
+          </a:xfrm>
+          <a:prstGeom prst="rect">
+            <a:avLst/>
+          </a:prstGeom>
+          <a:noFill/>
+          <a:extLst>
+            <a:ext uri="{909E8E84-426E-40DD-AFC4-6F175D3DCCD1}">
+              <a14:hiddenFill xmlns:a14="http://schemas.microsoft.com/office/drawing/2010/main">
+                <a:solidFill>
+                  <a:srgbClr val="FFFFFF"/>
+                </a:solidFill>
+              </a14:hiddenFill>
+            </a:ext>
+          </a:extLst>
+        </p:spPr>
+      </p:pic>
+      <p:pic>
+        <p:nvPicPr>
+          <p:cNvPr id="11" name="Picture 2" descr="https://upload.wikimedia.org/wikipedia/commons/a/a1/Zkip_alibaba3.png"/>
+          <p:cNvPicPr>
+            <a:picLocks noChangeAspect="1" noChangeArrowheads="1"/>
+          </p:cNvPicPr>
+          <p:nvPr/>
+        </p:nvPicPr>
+        <p:blipFill>
+          <a:blip r:embed="rId2" cstate="print">
+            <a:extLst>
+              <a:ext uri="{28A0092B-C50C-407E-A947-70E740481C1C}">
+                <a14:useLocalDpi xmlns:a14="http://schemas.microsoft.com/office/drawing/2010/main" val="0"/>
+              </a:ext>
+            </a:extLst>
+          </a:blip>
+          <a:srcRect/>
+          <a:stretch>
+            <a:fillRect/>
+          </a:stretch>
+        </p:blipFill>
+        <p:spPr bwMode="auto">
+          <a:xfrm>
+            <a:off x="9664766" y="4378831"/>
+            <a:ext cx="1464511" cy="1189640"/>
+          </a:xfrm>
+          <a:prstGeom prst="rect">
+            <a:avLst/>
+          </a:prstGeom>
+          <a:noFill/>
+          <a:extLst>
+            <a:ext uri="{909E8E84-426E-40DD-AFC4-6F175D3DCCD1}">
+              <a14:hiddenFill xmlns:a14="http://schemas.microsoft.com/office/drawing/2010/main">
+                <a:solidFill>
+                  <a:srgbClr val="FFFFFF"/>
+                </a:solidFill>
+              </a14:hiddenFill>
+            </a:ext>
+          </a:extLst>
+        </p:spPr>
+      </p:pic>
+      <p:pic>
+        <p:nvPicPr>
+          <p:cNvPr id="12" name="Picture 2" descr="https://upload.wikimedia.org/wikipedia/commons/a/a1/Zkip_alibaba3.png"/>
+          <p:cNvPicPr>
+            <a:picLocks noChangeAspect="1" noChangeArrowheads="1"/>
+          </p:cNvPicPr>
+          <p:nvPr/>
+        </p:nvPicPr>
+        <p:blipFill>
+          <a:blip r:embed="rId2" cstate="print">
+            <a:extLst>
+              <a:ext uri="{28A0092B-C50C-407E-A947-70E740481C1C}">
+                <a14:useLocalDpi xmlns:a14="http://schemas.microsoft.com/office/drawing/2010/main" val="0"/>
+              </a:ext>
+            </a:extLst>
+          </a:blip>
+          <a:srcRect/>
+          <a:stretch>
+            <a:fillRect/>
+          </a:stretch>
+        </p:blipFill>
+        <p:spPr bwMode="auto">
+          <a:xfrm>
+            <a:off x="8174344" y="4374977"/>
+            <a:ext cx="1464511" cy="1189640"/>
+          </a:xfrm>
+          <a:prstGeom prst="rect">
+            <a:avLst/>
+          </a:prstGeom>
+          <a:noFill/>
+          <a:extLst>
+            <a:ext uri="{909E8E84-426E-40DD-AFC4-6F175D3DCCD1}">
+              <a14:hiddenFill xmlns:a14="http://schemas.microsoft.com/office/drawing/2010/main">
+                <a:solidFill>
+                  <a:srgbClr val="FFFFFF"/>
+                </a:solidFill>
+              </a14:hiddenFill>
+            </a:ext>
+          </a:extLst>
+        </p:spPr>
+      </p:pic>
+      <p:pic>
+        <p:nvPicPr>
+          <p:cNvPr id="13" name="Picture 2" descr="https://upload.wikimedia.org/wikipedia/commons/a/a1/Zkip_alibaba3.png"/>
+          <p:cNvPicPr>
+            <a:picLocks noChangeAspect="1" noChangeArrowheads="1"/>
+          </p:cNvPicPr>
+          <p:nvPr/>
+        </p:nvPicPr>
+        <p:blipFill>
+          <a:blip r:embed="rId2" cstate="print">
+            <a:extLst>
+              <a:ext uri="{28A0092B-C50C-407E-A947-70E740481C1C}">
+                <a14:useLocalDpi xmlns:a14="http://schemas.microsoft.com/office/drawing/2010/main" val="0"/>
+              </a:ext>
+            </a:extLst>
+          </a:blip>
+          <a:srcRect/>
+          <a:stretch>
+            <a:fillRect/>
+          </a:stretch>
+        </p:blipFill>
+        <p:spPr bwMode="auto">
+          <a:xfrm>
+            <a:off x="6621773" y="4374977"/>
+            <a:ext cx="1464511" cy="1189640"/>
+          </a:xfrm>
+          <a:prstGeom prst="rect">
+            <a:avLst/>
+          </a:prstGeom>
+          <a:noFill/>
+          <a:extLst>
+            <a:ext uri="{909E8E84-426E-40DD-AFC4-6F175D3DCCD1}">
+              <a14:hiddenFill xmlns:a14="http://schemas.microsoft.com/office/drawing/2010/main">
+                <a:solidFill>
+                  <a:srgbClr val="FFFFFF"/>
+                </a:solidFill>
+              </a14:hiddenFill>
+            </a:ext>
+          </a:extLst>
+        </p:spPr>
+      </p:pic>
+    </p:spTree>
+    <p:extLst>
+      <p:ext uri="{BB962C8B-B14F-4D97-AF65-F5344CB8AC3E}">
+        <p14:creationId xmlns:p14="http://schemas.microsoft.com/office/powerpoint/2010/main" val="791410979"/>
+      </p:ext>
+    </p:extLst>
+  </p:cSld>
+  <p:clrMapOvr>
+    <a:masterClrMapping/>
+  </p:clrMapOvr>
+  <mc:AlternateContent xmlns:mc="http://schemas.openxmlformats.org/markup-compatibility/2006" xmlns:p14="http://schemas.microsoft.com/office/powerpoint/2010/main">
+    <mc:Choice Requires="p14">
+      <p:transition spd="med" p14:dur="700">
+        <p:fade/>
+      </p:transition>
+    </mc:Choice>
+    <mc:Fallback xmlns="">
+      <p:transition spd="med">
+        <p:fade/>
+      </p:transition>
+    </mc:Fallback>
+  </mc:AlternateContent>
+</p:sld>
+</file>
+
+<file path=ppt/slides/slide8.xml><?xml version="1.0" encoding="utf-8"?>
+<p:sld xmlns:a="http://schemas.openxmlformats.org/drawingml/2006/main" xmlns:r="http://schemas.openxmlformats.org/officeDocument/2006/relationships" xmlns:p="http://schemas.openxmlformats.org/presentationml/2006/main">
+  <p:cSld>
+    <p:spTree>
+      <p:nvGrpSpPr>
+        <p:cNvPr id="1" name=""/>
+        <p:cNvGrpSpPr/>
+        <p:nvPr/>
+      </p:nvGrpSpPr>
+      <p:grpSpPr>
+        <a:xfrm>
+          <a:off x="0" y="0"/>
+          <a:ext cx="0" cy="0"/>
+          <a:chOff x="0" y="0"/>
+          <a:chExt cx="0" cy="0"/>
+        </a:xfrm>
+      </p:grpSpPr>
+      <p:sp>
+        <p:nvSpPr>
+          <p:cNvPr id="2" name="Titre 1"/>
+          <p:cNvSpPr>
+            <a:spLocks noGrp="1"/>
+          </p:cNvSpPr>
+          <p:nvPr>
+            <p:ph type="title"/>
+          </p:nvPr>
+        </p:nvSpPr>
+        <p:spPr/>
+        <p:txBody>
+          <a:bodyPr/>
+          <a:lstStyle/>
+          <a:p>
+            <a:r>
               <a:rPr lang="fr-FR" dirty="0" err="1"/>
               <a:t>Schnorr</a:t>
             </a:r>
@@ -4998,8 +6035,8 @@
           </a:p>
         </p:txBody>
       </p:sp>
-      <mc:AlternateContent xmlns:mc="http://schemas.openxmlformats.org/markup-compatibility/2006">
-        <mc:Choice xmlns:a14="http://schemas.microsoft.com/office/drawing/2010/main" Requires="a14">
+      <mc:AlternateContent xmlns:mc="http://schemas.openxmlformats.org/markup-compatibility/2006" xmlns:a14="http://schemas.microsoft.com/office/drawing/2010/main">
+        <mc:Choice Requires="a14">
           <p:sp>
             <p:nvSpPr>
               <p:cNvPr id="4" name="Espace réservé du contenu 3"/>
@@ -5168,7 +6205,7 @@
             </p:txBody>
           </p:sp>
         </mc:Choice>
-        <mc:Fallback>
+        <mc:Fallback xmlns="">
           <p:sp>
             <p:nvSpPr>
               <p:cNvPr id="4" name="Espace réservé du contenu 3"/>
@@ -5227,7 +6264,7 @@
 </p:sld>
 </file>
 
-<file path=ppt/slides/slide8.xml><?xml version="1.0" encoding="utf-8"?>
+<file path=ppt/slides/slide9.xml><?xml version="1.0" encoding="utf-8"?>
 <p:sld xmlns:a="http://schemas.openxmlformats.org/drawingml/2006/main" xmlns:r="http://schemas.openxmlformats.org/officeDocument/2006/relationships" xmlns:p="http://schemas.openxmlformats.org/presentationml/2006/main">
   <p:cSld>
     <p:spTree>
@@ -5722,8 +6759,8 @@
           </a:fontRef>
         </p:style>
       </p:cxnSp>
-      <mc:AlternateContent xmlns:mc="http://schemas.openxmlformats.org/markup-compatibility/2006">
-        <mc:Choice xmlns:a14="http://schemas.microsoft.com/office/drawing/2010/main" Requires="a14">
+      <mc:AlternateContent xmlns:mc="http://schemas.openxmlformats.org/markup-compatibility/2006" xmlns:a14="http://schemas.microsoft.com/office/drawing/2010/main">
+        <mc:Choice Requires="a14">
           <p:sp>
             <p:nvSpPr>
               <p:cNvPr id="20" name="ZoneTexte 19"/>
@@ -5811,7 +6848,7 @@
             </p:txBody>
           </p:sp>
         </mc:Choice>
-        <mc:Fallback>
+        <mc:Fallback xmlns="">
           <p:sp>
             <p:nvSpPr>
               <p:cNvPr id="20" name="ZoneTexte 19"/>
@@ -5908,8 +6945,8 @@
           </a:p>
         </p:txBody>
       </p:sp>
-      <mc:AlternateContent xmlns:mc="http://schemas.openxmlformats.org/markup-compatibility/2006">
-        <mc:Choice xmlns:a14="http://schemas.microsoft.com/office/drawing/2010/main" Requires="a14">
+      <mc:AlternateContent xmlns:mc="http://schemas.openxmlformats.org/markup-compatibility/2006" xmlns:a14="http://schemas.microsoft.com/office/drawing/2010/main">
+        <mc:Choice Requires="a14">
           <p:sp>
             <p:nvSpPr>
               <p:cNvPr id="24" name="ZoneTexte 23"/>
@@ -6137,7 +7174,7 @@
             </p:txBody>
           </p:sp>
         </mc:Choice>
-        <mc:Fallback>
+        <mc:Fallback xmlns="">
           <p:sp>
             <p:nvSpPr>
               <p:cNvPr id="24" name="ZoneTexte 23"/>
@@ -6990,6 +8027,133 @@
 </file>
 
 <file path=customXml/item2.xml><?xml version="1.0" encoding="utf-8"?>
+<p:properties xmlns:p="http://schemas.microsoft.com/office/2006/metadata/properties" xmlns:xsi="http://www.w3.org/2001/XMLSchema-instance" xmlns:pc="http://schemas.microsoft.com/office/infopath/2007/PartnerControls">
+  <documentManagement>
+    <DirectSourceMarket xmlns="4873beb7-5857-4685-be1f-d57550cc96cc" xsi:nil="true"/>
+    <ApprovalStatus xmlns="4873beb7-5857-4685-be1f-d57550cc96cc">InProgress</ApprovalStatus>
+    <MarketSpecific xmlns="4873beb7-5857-4685-be1f-d57550cc96cc">false</MarketSpecific>
+    <LocComments xmlns="4873beb7-5857-4685-be1f-d57550cc96cc" xsi:nil="true"/>
+    <ThumbnailAssetId xmlns="4873beb7-5857-4685-be1f-d57550cc96cc" xsi:nil="true"/>
+    <PrimaryImageGen xmlns="4873beb7-5857-4685-be1f-d57550cc96cc">true</PrimaryImageGen>
+    <LegacyData xmlns="4873beb7-5857-4685-be1f-d57550cc96cc" xsi:nil="true"/>
+    <LocRecommendedHandoff xmlns="4873beb7-5857-4685-be1f-d57550cc96cc" xsi:nil="true"/>
+    <BusinessGroup xmlns="4873beb7-5857-4685-be1f-d57550cc96cc" xsi:nil="true"/>
+    <BlockPublish xmlns="4873beb7-5857-4685-be1f-d57550cc96cc">false</BlockPublish>
+    <TPFriendlyName xmlns="4873beb7-5857-4685-be1f-d57550cc96cc" xsi:nil="true"/>
+    <NumericId xmlns="4873beb7-5857-4685-be1f-d57550cc96cc" xsi:nil="true"/>
+    <APEditor xmlns="4873beb7-5857-4685-be1f-d57550cc96cc">
+      <UserInfo>
+        <DisplayName/>
+        <AccountId xsi:nil="true"/>
+        <AccountType/>
+      </UserInfo>
+    </APEditor>
+    <SourceTitle xmlns="4873beb7-5857-4685-be1f-d57550cc96cc" xsi:nil="true"/>
+    <OpenTemplate xmlns="4873beb7-5857-4685-be1f-d57550cc96cc">true</OpenTemplate>
+    <UALocComments xmlns="4873beb7-5857-4685-be1f-d57550cc96cc" xsi:nil="true"/>
+    <ParentAssetId xmlns="4873beb7-5857-4685-be1f-d57550cc96cc" xsi:nil="true"/>
+    <IntlLangReviewDate xmlns="4873beb7-5857-4685-be1f-d57550cc96cc" xsi:nil="true"/>
+    <FeatureTagsTaxHTField0 xmlns="4873beb7-5857-4685-be1f-d57550cc96cc">
+      <Terms xmlns="http://schemas.microsoft.com/office/infopath/2007/PartnerControls"/>
+    </FeatureTagsTaxHTField0>
+    <PublishStatusLookup xmlns="4873beb7-5857-4685-be1f-d57550cc96cc">
+      <Value>1564227</Value>
+    </PublishStatusLookup>
+    <Providers xmlns="4873beb7-5857-4685-be1f-d57550cc96cc" xsi:nil="true"/>
+    <MachineTranslated xmlns="4873beb7-5857-4685-be1f-d57550cc96cc">false</MachineTranslated>
+    <OriginalSourceMarket xmlns="4873beb7-5857-4685-be1f-d57550cc96cc" xsi:nil="true"/>
+    <APDescription xmlns="4873beb7-5857-4685-be1f-d57550cc96cc">Take your audience through a digital tunnel where they'll  burst through to the other side and see the information you want to present. Show them lists, charts, tables, SmartArt,  and pictures using a variety of layouts in widescreen (16X9) format. This design works well for subjects on science and technology, computers, communication, and more.   
+</APDescription>
+    <ClipArtFilename xmlns="4873beb7-5857-4685-be1f-d57550cc96cc" xsi:nil="true"/>
+    <ContentItem xmlns="4873beb7-5857-4685-be1f-d57550cc96cc" xsi:nil="true"/>
+    <TPInstallLocation xmlns="4873beb7-5857-4685-be1f-d57550cc96cc" xsi:nil="true"/>
+    <PublishTargets xmlns="4873beb7-5857-4685-be1f-d57550cc96cc">OfficeOnlineVNext</PublishTargets>
+    <TimesCloned xmlns="4873beb7-5857-4685-be1f-d57550cc96cc" xsi:nil="true"/>
+    <AssetStart xmlns="4873beb7-5857-4685-be1f-d57550cc96cc">2012-05-11T02:04:00+00:00</AssetStart>
+    <Provider xmlns="4873beb7-5857-4685-be1f-d57550cc96cc" xsi:nil="true"/>
+    <AcquiredFrom xmlns="4873beb7-5857-4685-be1f-d57550cc96cc">Internal MS</AcquiredFrom>
+    <FriendlyTitle xmlns="4873beb7-5857-4685-be1f-d57550cc96cc" xsi:nil="true"/>
+    <LastHandOff xmlns="4873beb7-5857-4685-be1f-d57550cc96cc" xsi:nil="true"/>
+    <TPClientViewer xmlns="4873beb7-5857-4685-be1f-d57550cc96cc" xsi:nil="true"/>
+    <UACurrentWords xmlns="4873beb7-5857-4685-be1f-d57550cc96cc" xsi:nil="true"/>
+    <ArtSampleDocs xmlns="4873beb7-5857-4685-be1f-d57550cc96cc" xsi:nil="true"/>
+    <UALocRecommendation xmlns="4873beb7-5857-4685-be1f-d57550cc96cc">Localize</UALocRecommendation>
+    <Manager xmlns="4873beb7-5857-4685-be1f-d57550cc96cc" xsi:nil="true"/>
+    <ShowIn xmlns="4873beb7-5857-4685-be1f-d57550cc96cc">Show everywhere</ShowIn>
+    <UANotes xmlns="4873beb7-5857-4685-be1f-d57550cc96cc" xsi:nil="true"/>
+    <TemplateStatus xmlns="4873beb7-5857-4685-be1f-d57550cc96cc">Complete</TemplateStatus>
+    <InternalTagsTaxHTField0 xmlns="4873beb7-5857-4685-be1f-d57550cc96cc">
+      <Terms xmlns="http://schemas.microsoft.com/office/infopath/2007/PartnerControls"/>
+    </InternalTagsTaxHTField0>
+    <CSXHash xmlns="4873beb7-5857-4685-be1f-d57550cc96cc" xsi:nil="true"/>
+    <Downloads xmlns="4873beb7-5857-4685-be1f-d57550cc96cc">0</Downloads>
+    <VoteCount xmlns="4873beb7-5857-4685-be1f-d57550cc96cc" xsi:nil="true"/>
+    <OOCacheId xmlns="4873beb7-5857-4685-be1f-d57550cc96cc" xsi:nil="true"/>
+    <IsDeleted xmlns="4873beb7-5857-4685-be1f-d57550cc96cc">false</IsDeleted>
+    <AssetExpire xmlns="4873beb7-5857-4685-be1f-d57550cc96cc">2029-01-01T08:00:00+00:00</AssetExpire>
+    <DSATActionTaken xmlns="4873beb7-5857-4685-be1f-d57550cc96cc" xsi:nil="true"/>
+    <CSXSubmissionMarket xmlns="4873beb7-5857-4685-be1f-d57550cc96cc" xsi:nil="true"/>
+    <TPExecutable xmlns="4873beb7-5857-4685-be1f-d57550cc96cc" xsi:nil="true"/>
+    <SubmitterId xmlns="4873beb7-5857-4685-be1f-d57550cc96cc" xsi:nil="true"/>
+    <EditorialTags xmlns="4873beb7-5857-4685-be1f-d57550cc96cc" xsi:nil="true"/>
+    <ApprovalLog xmlns="4873beb7-5857-4685-be1f-d57550cc96cc" xsi:nil="true"/>
+    <AssetType xmlns="4873beb7-5857-4685-be1f-d57550cc96cc">TP</AssetType>
+    <BugNumber xmlns="4873beb7-5857-4685-be1f-d57550cc96cc" xsi:nil="true"/>
+    <CSXSubmissionDate xmlns="4873beb7-5857-4685-be1f-d57550cc96cc" xsi:nil="true"/>
+    <CSXUpdate xmlns="4873beb7-5857-4685-be1f-d57550cc96cc">false</CSXUpdate>
+    <Milestone xmlns="4873beb7-5857-4685-be1f-d57550cc96cc" xsi:nil="true"/>
+    <RecommendationsModifier xmlns="4873beb7-5857-4685-be1f-d57550cc96cc" xsi:nil="true"/>
+    <OriginAsset xmlns="4873beb7-5857-4685-be1f-d57550cc96cc" xsi:nil="true"/>
+    <TPComponent xmlns="4873beb7-5857-4685-be1f-d57550cc96cc" xsi:nil="true"/>
+    <AssetId xmlns="4873beb7-5857-4685-be1f-d57550cc96cc">TP102895246</AssetId>
+    <IntlLocPriority xmlns="4873beb7-5857-4685-be1f-d57550cc96cc" xsi:nil="true"/>
+    <PolicheckWords xmlns="4873beb7-5857-4685-be1f-d57550cc96cc" xsi:nil="true"/>
+    <TPLaunchHelpLink xmlns="4873beb7-5857-4685-be1f-d57550cc96cc" xsi:nil="true"/>
+    <TPApplication xmlns="4873beb7-5857-4685-be1f-d57550cc96cc" xsi:nil="true"/>
+    <CrawlForDependencies xmlns="4873beb7-5857-4685-be1f-d57550cc96cc">false</CrawlForDependencies>
+    <HandoffToMSDN xmlns="4873beb7-5857-4685-be1f-d57550cc96cc" xsi:nil="true"/>
+    <PlannedPubDate xmlns="4873beb7-5857-4685-be1f-d57550cc96cc" xsi:nil="true"/>
+    <IntlLangReviewer xmlns="4873beb7-5857-4685-be1f-d57550cc96cc" xsi:nil="true"/>
+    <TrustLevel xmlns="4873beb7-5857-4685-be1f-d57550cc96cc">1 Microsoft Managed Content</TrustLevel>
+    <LocLastLocAttemptVersionLookup xmlns="4873beb7-5857-4685-be1f-d57550cc96cc">835483</LocLastLocAttemptVersionLookup>
+    <IsSearchable xmlns="4873beb7-5857-4685-be1f-d57550cc96cc">true</IsSearchable>
+    <TemplateTemplateType xmlns="4873beb7-5857-4685-be1f-d57550cc96cc">PowerPoint Presentation Template</TemplateTemplateType>
+    <CampaignTagsTaxHTField0 xmlns="4873beb7-5857-4685-be1f-d57550cc96cc">
+      <Terms xmlns="http://schemas.microsoft.com/office/infopath/2007/PartnerControls"/>
+    </CampaignTagsTaxHTField0>
+    <TPNamespace xmlns="4873beb7-5857-4685-be1f-d57550cc96cc" xsi:nil="true"/>
+    <TaxCatchAll xmlns="4873beb7-5857-4685-be1f-d57550cc96cc"/>
+    <Markets xmlns="4873beb7-5857-4685-be1f-d57550cc96cc"/>
+    <UAProjectedTotalWords xmlns="4873beb7-5857-4685-be1f-d57550cc96cc" xsi:nil="true"/>
+    <IntlLangReview xmlns="4873beb7-5857-4685-be1f-d57550cc96cc">false</IntlLangReview>
+    <OutputCachingOn xmlns="4873beb7-5857-4685-be1f-d57550cc96cc">false</OutputCachingOn>
+    <AverageRating xmlns="4873beb7-5857-4685-be1f-d57550cc96cc" xsi:nil="true"/>
+    <APAuthor xmlns="4873beb7-5857-4685-be1f-d57550cc96cc">
+      <UserInfo>
+        <DisplayName>REDMOND\v-vaddu</DisplayName>
+        <AccountId>2567</AccountId>
+        <AccountType/>
+      </UserInfo>
+    </APAuthor>
+    <LocManualTestRequired xmlns="4873beb7-5857-4685-be1f-d57550cc96cc">false</LocManualTestRequired>
+    <TPCommandLine xmlns="4873beb7-5857-4685-be1f-d57550cc96cc" xsi:nil="true"/>
+    <TPAppVersion xmlns="4873beb7-5857-4685-be1f-d57550cc96cc" xsi:nil="true"/>
+    <EditorialStatus xmlns="4873beb7-5857-4685-be1f-d57550cc96cc">Complete</EditorialStatus>
+    <LastModifiedDateTime xmlns="4873beb7-5857-4685-be1f-d57550cc96cc" xsi:nil="true"/>
+    <ScenarioTagsTaxHTField0 xmlns="4873beb7-5857-4685-be1f-d57550cc96cc">
+      <Terms xmlns="http://schemas.microsoft.com/office/infopath/2007/PartnerControls"/>
+    </ScenarioTagsTaxHTField0>
+    <OriginalRelease xmlns="4873beb7-5857-4685-be1f-d57550cc96cc">15</OriginalRelease>
+    <TPLaunchHelpLinkType xmlns="4873beb7-5857-4685-be1f-d57550cc96cc">Template</TPLaunchHelpLinkType>
+    <LocalizationTagsTaxHTField0 xmlns="4873beb7-5857-4685-be1f-d57550cc96cc">
+      <Terms xmlns="http://schemas.microsoft.com/office/infopath/2007/PartnerControls"/>
+    </LocalizationTagsTaxHTField0>
+    <LocMarketGroupTiers2 xmlns="4873beb7-5857-4685-be1f-d57550cc96cc" xsi:nil="true"/>
+  </documentManagement>
+</p:properties>
+</file>
+
+<file path=customXml/item3.xml><?xml version="1.0" encoding="utf-8"?>
 <ct:contentTypeSchema xmlns:ct="http://schemas.microsoft.com/office/2006/metadata/contentType" xmlns:ma="http://schemas.microsoft.com/office/2006/metadata/properties/metaAttributes" ct:_="" ma:_="" ma:contentTypeName="TemplateFile" ma:contentTypeID="0x0101006EDDDB5EE6D98C44930B742096920B300400F5B6D36B3EF94B4E9A635CDF2A18F5B8" ma:contentTypeVersion="72" ma:contentTypeDescription="Create a new document." ma:contentTypeScope="" ma:versionID="a23e56308344d904b51738559c3d67c9">
   <xsd:schema xmlns:xsd="http://www.w3.org/2001/XMLSchema" xmlns:xs="http://www.w3.org/2001/XMLSchema" xmlns:p="http://schemas.microsoft.com/office/2006/metadata/properties" xmlns:ns2="4873beb7-5857-4685-be1f-d57550cc96cc" targetNamespace="http://schemas.microsoft.com/office/2006/metadata/properties" ma:root="true" ma:fieldsID="cd0908cc4600e77bf5da051303e00c8d" ns2:_="">
     <xsd:import namespace="4873beb7-5857-4685-be1f-d57550cc96cc"/>
@@ -8029,133 +9193,6 @@
 </ct:contentTypeSchema>
 </file>
 
-<file path=customXml/item3.xml><?xml version="1.0" encoding="utf-8"?>
-<p:properties xmlns:p="http://schemas.microsoft.com/office/2006/metadata/properties" xmlns:xsi="http://www.w3.org/2001/XMLSchema-instance" xmlns:pc="http://schemas.microsoft.com/office/infopath/2007/PartnerControls">
-  <documentManagement>
-    <DirectSourceMarket xmlns="4873beb7-5857-4685-be1f-d57550cc96cc" xsi:nil="true"/>
-    <ApprovalStatus xmlns="4873beb7-5857-4685-be1f-d57550cc96cc">InProgress</ApprovalStatus>
-    <MarketSpecific xmlns="4873beb7-5857-4685-be1f-d57550cc96cc">false</MarketSpecific>
-    <LocComments xmlns="4873beb7-5857-4685-be1f-d57550cc96cc" xsi:nil="true"/>
-    <ThumbnailAssetId xmlns="4873beb7-5857-4685-be1f-d57550cc96cc" xsi:nil="true"/>
-    <PrimaryImageGen xmlns="4873beb7-5857-4685-be1f-d57550cc96cc">true</PrimaryImageGen>
-    <LegacyData xmlns="4873beb7-5857-4685-be1f-d57550cc96cc" xsi:nil="true"/>
-    <LocRecommendedHandoff xmlns="4873beb7-5857-4685-be1f-d57550cc96cc" xsi:nil="true"/>
-    <BusinessGroup xmlns="4873beb7-5857-4685-be1f-d57550cc96cc" xsi:nil="true"/>
-    <BlockPublish xmlns="4873beb7-5857-4685-be1f-d57550cc96cc">false</BlockPublish>
-    <TPFriendlyName xmlns="4873beb7-5857-4685-be1f-d57550cc96cc" xsi:nil="true"/>
-    <NumericId xmlns="4873beb7-5857-4685-be1f-d57550cc96cc" xsi:nil="true"/>
-    <APEditor xmlns="4873beb7-5857-4685-be1f-d57550cc96cc">
-      <UserInfo>
-        <DisplayName/>
-        <AccountId xsi:nil="true"/>
-        <AccountType/>
-      </UserInfo>
-    </APEditor>
-    <SourceTitle xmlns="4873beb7-5857-4685-be1f-d57550cc96cc" xsi:nil="true"/>
-    <OpenTemplate xmlns="4873beb7-5857-4685-be1f-d57550cc96cc">true</OpenTemplate>
-    <UALocComments xmlns="4873beb7-5857-4685-be1f-d57550cc96cc" xsi:nil="true"/>
-    <ParentAssetId xmlns="4873beb7-5857-4685-be1f-d57550cc96cc" xsi:nil="true"/>
-    <IntlLangReviewDate xmlns="4873beb7-5857-4685-be1f-d57550cc96cc" xsi:nil="true"/>
-    <FeatureTagsTaxHTField0 xmlns="4873beb7-5857-4685-be1f-d57550cc96cc">
-      <Terms xmlns="http://schemas.microsoft.com/office/infopath/2007/PartnerControls"/>
-    </FeatureTagsTaxHTField0>
-    <PublishStatusLookup xmlns="4873beb7-5857-4685-be1f-d57550cc96cc">
-      <Value>1564227</Value>
-    </PublishStatusLookup>
-    <Providers xmlns="4873beb7-5857-4685-be1f-d57550cc96cc" xsi:nil="true"/>
-    <MachineTranslated xmlns="4873beb7-5857-4685-be1f-d57550cc96cc">false</MachineTranslated>
-    <OriginalSourceMarket xmlns="4873beb7-5857-4685-be1f-d57550cc96cc" xsi:nil="true"/>
-    <APDescription xmlns="4873beb7-5857-4685-be1f-d57550cc96cc">Take your audience through a digital tunnel where they'll  burst through to the other side and see the information you want to present. Show them lists, charts, tables, SmartArt,  and pictures using a variety of layouts in widescreen (16X9) format. This design works well for subjects on science and technology, computers, communication, and more.   
-</APDescription>
-    <ClipArtFilename xmlns="4873beb7-5857-4685-be1f-d57550cc96cc" xsi:nil="true"/>
-    <ContentItem xmlns="4873beb7-5857-4685-be1f-d57550cc96cc" xsi:nil="true"/>
-    <TPInstallLocation xmlns="4873beb7-5857-4685-be1f-d57550cc96cc" xsi:nil="true"/>
-    <PublishTargets xmlns="4873beb7-5857-4685-be1f-d57550cc96cc">OfficeOnlineVNext</PublishTargets>
-    <TimesCloned xmlns="4873beb7-5857-4685-be1f-d57550cc96cc" xsi:nil="true"/>
-    <AssetStart xmlns="4873beb7-5857-4685-be1f-d57550cc96cc">2012-05-11T02:04:00+00:00</AssetStart>
-    <Provider xmlns="4873beb7-5857-4685-be1f-d57550cc96cc" xsi:nil="true"/>
-    <AcquiredFrom xmlns="4873beb7-5857-4685-be1f-d57550cc96cc">Internal MS</AcquiredFrom>
-    <FriendlyTitle xmlns="4873beb7-5857-4685-be1f-d57550cc96cc" xsi:nil="true"/>
-    <LastHandOff xmlns="4873beb7-5857-4685-be1f-d57550cc96cc" xsi:nil="true"/>
-    <TPClientViewer xmlns="4873beb7-5857-4685-be1f-d57550cc96cc" xsi:nil="true"/>
-    <UACurrentWords xmlns="4873beb7-5857-4685-be1f-d57550cc96cc" xsi:nil="true"/>
-    <ArtSampleDocs xmlns="4873beb7-5857-4685-be1f-d57550cc96cc" xsi:nil="true"/>
-    <UALocRecommendation xmlns="4873beb7-5857-4685-be1f-d57550cc96cc">Localize</UALocRecommendation>
-    <Manager xmlns="4873beb7-5857-4685-be1f-d57550cc96cc" xsi:nil="true"/>
-    <ShowIn xmlns="4873beb7-5857-4685-be1f-d57550cc96cc">Show everywhere</ShowIn>
-    <UANotes xmlns="4873beb7-5857-4685-be1f-d57550cc96cc" xsi:nil="true"/>
-    <TemplateStatus xmlns="4873beb7-5857-4685-be1f-d57550cc96cc">Complete</TemplateStatus>
-    <InternalTagsTaxHTField0 xmlns="4873beb7-5857-4685-be1f-d57550cc96cc">
-      <Terms xmlns="http://schemas.microsoft.com/office/infopath/2007/PartnerControls"/>
-    </InternalTagsTaxHTField0>
-    <CSXHash xmlns="4873beb7-5857-4685-be1f-d57550cc96cc" xsi:nil="true"/>
-    <Downloads xmlns="4873beb7-5857-4685-be1f-d57550cc96cc">0</Downloads>
-    <VoteCount xmlns="4873beb7-5857-4685-be1f-d57550cc96cc" xsi:nil="true"/>
-    <OOCacheId xmlns="4873beb7-5857-4685-be1f-d57550cc96cc" xsi:nil="true"/>
-    <IsDeleted xmlns="4873beb7-5857-4685-be1f-d57550cc96cc">false</IsDeleted>
-    <AssetExpire xmlns="4873beb7-5857-4685-be1f-d57550cc96cc">2029-01-01T08:00:00+00:00</AssetExpire>
-    <DSATActionTaken xmlns="4873beb7-5857-4685-be1f-d57550cc96cc" xsi:nil="true"/>
-    <CSXSubmissionMarket xmlns="4873beb7-5857-4685-be1f-d57550cc96cc" xsi:nil="true"/>
-    <TPExecutable xmlns="4873beb7-5857-4685-be1f-d57550cc96cc" xsi:nil="true"/>
-    <SubmitterId xmlns="4873beb7-5857-4685-be1f-d57550cc96cc" xsi:nil="true"/>
-    <EditorialTags xmlns="4873beb7-5857-4685-be1f-d57550cc96cc" xsi:nil="true"/>
-    <ApprovalLog xmlns="4873beb7-5857-4685-be1f-d57550cc96cc" xsi:nil="true"/>
-    <AssetType xmlns="4873beb7-5857-4685-be1f-d57550cc96cc">TP</AssetType>
-    <BugNumber xmlns="4873beb7-5857-4685-be1f-d57550cc96cc" xsi:nil="true"/>
-    <CSXSubmissionDate xmlns="4873beb7-5857-4685-be1f-d57550cc96cc" xsi:nil="true"/>
-    <CSXUpdate xmlns="4873beb7-5857-4685-be1f-d57550cc96cc">false</CSXUpdate>
-    <Milestone xmlns="4873beb7-5857-4685-be1f-d57550cc96cc" xsi:nil="true"/>
-    <RecommendationsModifier xmlns="4873beb7-5857-4685-be1f-d57550cc96cc" xsi:nil="true"/>
-    <OriginAsset xmlns="4873beb7-5857-4685-be1f-d57550cc96cc" xsi:nil="true"/>
-    <TPComponent xmlns="4873beb7-5857-4685-be1f-d57550cc96cc" xsi:nil="true"/>
-    <AssetId xmlns="4873beb7-5857-4685-be1f-d57550cc96cc">TP102895246</AssetId>
-    <IntlLocPriority xmlns="4873beb7-5857-4685-be1f-d57550cc96cc" xsi:nil="true"/>
-    <PolicheckWords xmlns="4873beb7-5857-4685-be1f-d57550cc96cc" xsi:nil="true"/>
-    <TPLaunchHelpLink xmlns="4873beb7-5857-4685-be1f-d57550cc96cc" xsi:nil="true"/>
-    <TPApplication xmlns="4873beb7-5857-4685-be1f-d57550cc96cc" xsi:nil="true"/>
-    <CrawlForDependencies xmlns="4873beb7-5857-4685-be1f-d57550cc96cc">false</CrawlForDependencies>
-    <HandoffToMSDN xmlns="4873beb7-5857-4685-be1f-d57550cc96cc" xsi:nil="true"/>
-    <PlannedPubDate xmlns="4873beb7-5857-4685-be1f-d57550cc96cc" xsi:nil="true"/>
-    <IntlLangReviewer xmlns="4873beb7-5857-4685-be1f-d57550cc96cc" xsi:nil="true"/>
-    <TrustLevel xmlns="4873beb7-5857-4685-be1f-d57550cc96cc">1 Microsoft Managed Content</TrustLevel>
-    <LocLastLocAttemptVersionLookup xmlns="4873beb7-5857-4685-be1f-d57550cc96cc">835483</LocLastLocAttemptVersionLookup>
-    <IsSearchable xmlns="4873beb7-5857-4685-be1f-d57550cc96cc">true</IsSearchable>
-    <TemplateTemplateType xmlns="4873beb7-5857-4685-be1f-d57550cc96cc">PowerPoint Presentation Template</TemplateTemplateType>
-    <CampaignTagsTaxHTField0 xmlns="4873beb7-5857-4685-be1f-d57550cc96cc">
-      <Terms xmlns="http://schemas.microsoft.com/office/infopath/2007/PartnerControls"/>
-    </CampaignTagsTaxHTField0>
-    <TPNamespace xmlns="4873beb7-5857-4685-be1f-d57550cc96cc" xsi:nil="true"/>
-    <TaxCatchAll xmlns="4873beb7-5857-4685-be1f-d57550cc96cc"/>
-    <Markets xmlns="4873beb7-5857-4685-be1f-d57550cc96cc"/>
-    <UAProjectedTotalWords xmlns="4873beb7-5857-4685-be1f-d57550cc96cc" xsi:nil="true"/>
-    <IntlLangReview xmlns="4873beb7-5857-4685-be1f-d57550cc96cc">false</IntlLangReview>
-    <OutputCachingOn xmlns="4873beb7-5857-4685-be1f-d57550cc96cc">false</OutputCachingOn>
-    <AverageRating xmlns="4873beb7-5857-4685-be1f-d57550cc96cc" xsi:nil="true"/>
-    <APAuthor xmlns="4873beb7-5857-4685-be1f-d57550cc96cc">
-      <UserInfo>
-        <DisplayName>REDMOND\v-vaddu</DisplayName>
-        <AccountId>2567</AccountId>
-        <AccountType/>
-      </UserInfo>
-    </APAuthor>
-    <LocManualTestRequired xmlns="4873beb7-5857-4685-be1f-d57550cc96cc">false</LocManualTestRequired>
-    <TPCommandLine xmlns="4873beb7-5857-4685-be1f-d57550cc96cc" xsi:nil="true"/>
-    <TPAppVersion xmlns="4873beb7-5857-4685-be1f-d57550cc96cc" xsi:nil="true"/>
-    <EditorialStatus xmlns="4873beb7-5857-4685-be1f-d57550cc96cc">Complete</EditorialStatus>
-    <LastModifiedDateTime xmlns="4873beb7-5857-4685-be1f-d57550cc96cc" xsi:nil="true"/>
-    <ScenarioTagsTaxHTField0 xmlns="4873beb7-5857-4685-be1f-d57550cc96cc">
-      <Terms xmlns="http://schemas.microsoft.com/office/infopath/2007/PartnerControls"/>
-    </ScenarioTagsTaxHTField0>
-    <OriginalRelease xmlns="4873beb7-5857-4685-be1f-d57550cc96cc">15</OriginalRelease>
-    <TPLaunchHelpLinkType xmlns="4873beb7-5857-4685-be1f-d57550cc96cc">Template</TPLaunchHelpLinkType>
-    <LocalizationTagsTaxHTField0 xmlns="4873beb7-5857-4685-be1f-d57550cc96cc">
-      <Terms xmlns="http://schemas.microsoft.com/office/infopath/2007/PartnerControls"/>
-    </LocalizationTagsTaxHTField0>
-    <LocMarketGroupTiers2 xmlns="4873beb7-5857-4685-be1f-d57550cc96cc" xsi:nil="true"/>
-  </documentManagement>
-</p:properties>
-</file>
-
 <file path=customXml/itemProps1.xml><?xml version="1.0" encoding="utf-8"?>
 <ds:datastoreItem xmlns:ds="http://schemas.openxmlformats.org/officeDocument/2006/customXml" ds:itemID="{74228E6B-D70C-44BB-A81F-A245495F612B}">
   <ds:schemaRefs>
@@ -8165,6 +9202,16 @@
 </file>
 
 <file path=customXml/itemProps2.xml><?xml version="1.0" encoding="utf-8"?>
+<ds:datastoreItem xmlns:ds="http://schemas.openxmlformats.org/officeDocument/2006/customXml" ds:itemID="{00E41224-0370-4595-877C-23316CD80004}">
+  <ds:schemaRefs>
+    <ds:schemaRef ds:uri="http://schemas.microsoft.com/office/2006/metadata/properties"/>
+    <ds:schemaRef ds:uri="http://schemas.microsoft.com/office/infopath/2007/PartnerControls"/>
+    <ds:schemaRef ds:uri="4873beb7-5857-4685-be1f-d57550cc96cc"/>
+  </ds:schemaRefs>
+</ds:datastoreItem>
+</file>
+
+<file path=customXml/itemProps3.xml><?xml version="1.0" encoding="utf-8"?>
 <ds:datastoreItem xmlns:ds="http://schemas.openxmlformats.org/officeDocument/2006/customXml" ds:itemID="{22CCB507-0646-4A50-A4F7-7F385079D589}">
   <ds:schemaRefs>
     <ds:schemaRef ds:uri="http://schemas.microsoft.com/office/2006/metadata/contentType"/>
@@ -8180,14 +9227,4 @@
     <ds:schemaRef ds:uri="http://schemas.microsoft.com/internal/obd"/>
   </ds:schemaRefs>
 </ds:datastoreItem>
-</file>
-
-<file path=customXml/itemProps3.xml><?xml version="1.0" encoding="utf-8"?>
-<ds:datastoreItem xmlns:ds="http://schemas.openxmlformats.org/officeDocument/2006/customXml" ds:itemID="{00E41224-0370-4595-877C-23316CD80004}">
-  <ds:schemaRefs>
-    <ds:schemaRef ds:uri="http://schemas.microsoft.com/office/2006/metadata/properties"/>
-    <ds:schemaRef ds:uri="http://schemas.microsoft.com/office/infopath/2007/PartnerControls"/>
-    <ds:schemaRef ds:uri="4873beb7-5857-4685-be1f-d57550cc96cc"/>
-  </ds:schemaRefs>
-</ds:datastoreItem>
 </file>
</xml_diff>

<commit_message>
added couple of slides
</commit_message>
<xml_diff>
--- a/Zero knowledge.pptx
+++ b/Zero knowledge.pptx
@@ -5,10 +5,10 @@
     <p:sldMasterId id="2147483648" r:id="rId4"/>
   </p:sldMasterIdLst>
   <p:notesMasterIdLst>
-    <p:notesMasterId r:id="rId20"/>
+    <p:notesMasterId r:id="rId22"/>
   </p:notesMasterIdLst>
   <p:handoutMasterIdLst>
-    <p:handoutMasterId r:id="rId21"/>
+    <p:handoutMasterId r:id="rId23"/>
   </p:handoutMasterIdLst>
   <p:sldIdLst>
     <p:sldId id="265" r:id="rId5"/>
@@ -20,21 +20,23 @@
     <p:sldId id="324" r:id="rId11"/>
     <p:sldId id="322" r:id="rId12"/>
     <p:sldId id="323" r:id="rId13"/>
-    <p:sldId id="325" r:id="rId14"/>
-    <p:sldId id="330" r:id="rId15"/>
-    <p:sldId id="326" r:id="rId16"/>
-    <p:sldId id="327" r:id="rId17"/>
-    <p:sldId id="328" r:id="rId18"/>
-    <p:sldId id="329" r:id="rId19"/>
+    <p:sldId id="331" r:id="rId14"/>
+    <p:sldId id="332" r:id="rId15"/>
+    <p:sldId id="325" r:id="rId16"/>
+    <p:sldId id="330" r:id="rId17"/>
+    <p:sldId id="326" r:id="rId18"/>
+    <p:sldId id="327" r:id="rId19"/>
+    <p:sldId id="328" r:id="rId20"/>
+    <p:sldId id="329" r:id="rId21"/>
   </p:sldIdLst>
   <p:sldSz cx="12188825" cy="6858000"/>
   <p:notesSz cx="6858000" cy="9144000"/>
   <p:custDataLst>
-    <p:tags r:id="rId22"/>
+    <p:tags r:id="rId25"/>
   </p:custDataLst>
   <p:defaultTextStyle>
     <a:defPPr rtl="0">
-      <a:defRPr lang="fr-fr"/>
+      <a:defRPr lang="x-none"/>
     </a:defPPr>
     <a:lvl1pPr marL="0" algn="l" defTabSz="914400" rtl="0" eaLnBrk="1" latinLnBrk="0" hangingPunct="1">
       <a:defRPr sz="1800" kern="1200">
@@ -129,7 +131,7 @@
   </p:defaultTextStyle>
   <p:extLst>
     <p:ext uri="{EFAFB233-063F-42B5-8137-9DF3F51BA10A}">
-      <p15:sldGuideLst xmlns:p15="http://schemas.microsoft.com/office/powerpoint/2012/main">
+      <p15:sldGuideLst xmlns:p15="http://schemas.microsoft.com/office/powerpoint/2012/main" xmlns="">
         <p15:guide id="1" pos="3839" userDrawn="1">
           <p15:clr>
             <a:srgbClr val="A4A3A4"/>
@@ -143,7 +145,7 @@
       </p15:sldGuideLst>
     </p:ext>
     <p:ext uri="{2D200454-40CA-4A62-9FC3-DE9A4176ACB9}">
-      <p15:notesGuideLst xmlns:p15="http://schemas.microsoft.com/office/powerpoint/2012/main"/>
+      <p15:notesGuideLst xmlns:p15="http://schemas.microsoft.com/office/powerpoint/2012/main" xmlns=""/>
     </p:ext>
   </p:extLst>
 </p:presentation>
@@ -237,7 +239,7 @@
             <a:pPr algn="r" rtl="0"/>
             <a:fld id="{4FD0811F-65A0-45DC-A418-D7D88257DA14}" type="datetime1">
               <a:rPr lang="fr-FR" smtClean="0"/>
-              <a:t>12/05/2017</a:t>
+              <a:t>5/12/17</a:t>
             </a:fld>
             <a:endParaRPr lang="fr-FR" dirty="0"/>
           </a:p>
@@ -407,7 +409,7 @@
             <a:fld id="{869BCCB5-3197-42F0-A23E-FBF35BB6BD6D}" type="datetime1">
               <a:rPr lang="fr-FR" smtClean="0"/>
               <a:pPr/>
-              <a:t>12/05/2017</a:t>
+              <a:t>5/12/17</a:t>
             </a:fld>
             <a:endParaRPr lang="fr-FR" dirty="0"/>
           </a:p>
@@ -1013,7 +1015,7 @@
             <a:fld id="{C169FE22-A35D-4AA5-9ED0-CA5AA0D08EE7}" type="datetime1">
               <a:rPr lang="fr-FR" smtClean="0"/>
               <a:pPr/>
-              <a:t>12/05/2017</a:t>
+              <a:t>5/12/17</a:t>
             </a:fld>
             <a:endParaRPr lang="fr-FR" dirty="0"/>
           </a:p>
@@ -1213,7 +1215,7 @@
             <a:fld id="{4B2D50EC-F18A-4356-A82F-ED015F56C2C6}" type="datetime1">
               <a:rPr lang="fr-FR" smtClean="0"/>
               <a:pPr/>
-              <a:t>12/05/2017</a:t>
+              <a:t>5/12/17</a:t>
             </a:fld>
             <a:endParaRPr lang="fr-FR" dirty="0"/>
           </a:p>
@@ -1410,7 +1412,7 @@
             <a:fld id="{D8AB5196-52B1-4918-B153-34A0C9A4A7AD}" type="datetime1">
               <a:rPr lang="fr-FR" smtClean="0"/>
               <a:pPr/>
-              <a:t>12/05/2017</a:t>
+              <a:t>5/12/17</a:t>
             </a:fld>
             <a:endParaRPr lang="fr-FR" dirty="0"/>
           </a:p>
@@ -1698,7 +1700,7 @@
             <a:fld id="{7399499F-CA45-4A76-BC24-F973E24AC3FB}" type="datetime1">
               <a:rPr lang="fr-FR" smtClean="0"/>
               <a:pPr/>
-              <a:t>12/05/2017</a:t>
+              <a:t>5/12/17</a:t>
             </a:fld>
             <a:endParaRPr lang="fr-FR" dirty="0"/>
           </a:p>
@@ -2010,7 +2012,7 @@
             <a:fld id="{3817870C-A0A5-4D92-B86D-C2791EFA3A23}" type="datetime1">
               <a:rPr lang="fr-FR" smtClean="0"/>
               <a:pPr/>
-              <a:t>12/05/2017</a:t>
+              <a:t>5/12/17</a:t>
             </a:fld>
             <a:endParaRPr lang="fr-FR" dirty="0"/>
           </a:p>
@@ -2478,7 +2480,7 @@
             <a:fld id="{812A7B89-83CE-4355-8D19-9AD5D8179E27}" type="datetime1">
               <a:rPr lang="fr-FR" smtClean="0"/>
               <a:pPr/>
-              <a:t>12/05/2017</a:t>
+              <a:t>5/12/17</a:t>
             </a:fld>
             <a:endParaRPr lang="fr-FR" dirty="0"/>
           </a:p>
@@ -2620,7 +2622,7 @@
             <a:fld id="{EA4593A4-CD22-4D89-9631-B432485C88BE}" type="datetime1">
               <a:rPr lang="fr-FR" smtClean="0"/>
               <a:pPr/>
-              <a:t>12/05/2017</a:t>
+              <a:t>5/12/17</a:t>
             </a:fld>
             <a:endParaRPr lang="fr-FR" dirty="0"/>
           </a:p>
@@ -2742,7 +2744,7 @@
             <a:fld id="{88F3045D-8AE6-4E47-932F-47FA387FEA34}" type="datetime1">
               <a:rPr lang="fr-FR" smtClean="0"/>
               <a:pPr/>
-              <a:t>12/05/2017</a:t>
+              <a:t>5/12/17</a:t>
             </a:fld>
             <a:endParaRPr lang="fr-FR" dirty="0"/>
           </a:p>
@@ -3072,7 +3074,7 @@
             <a:fld id="{2282C9DA-93FE-4DDE-8920-2C8AB1F5E18A}" type="datetime1">
               <a:rPr lang="fr-FR" smtClean="0"/>
               <a:pPr/>
-              <a:t>12/05/2017</a:t>
+              <a:t>5/12/17</a:t>
             </a:fld>
             <a:endParaRPr lang="fr-FR" dirty="0"/>
           </a:p>
@@ -3392,7 +3394,7 @@
             <a:fld id="{EB002A6A-F78C-474F-BA6B-17AE42EC613D}" type="datetime1">
               <a:rPr lang="fr-FR" smtClean="0"/>
               <a:pPr/>
-              <a:t>12/05/2017</a:t>
+              <a:t>5/12/17</a:t>
             </a:fld>
             <a:endParaRPr lang="fr-FR" dirty="0"/>
           </a:p>
@@ -3629,7 +3631,7 @@
             <a:fld id="{B1406553-4B01-4903-B663-70E503E45D52}" type="datetime1">
               <a:rPr lang="fr-FR" smtClean="0"/>
               <a:pPr/>
-              <a:t>12/05/2017</a:t>
+              <a:t>5/12/17</a:t>
             </a:fld>
             <a:endParaRPr lang="fr-FR" dirty="0"/>
           </a:p>
@@ -4050,7 +4052,7 @@
   </p:txStyles>
   <p:extLst mod="1">
     <p:ext uri="{27BBF7A9-308A-43DC-89C8-2F10F3537804}">
-      <p15:sldGuideLst xmlns:p15="http://schemas.microsoft.com/office/powerpoint/2012/main">
+      <p15:sldGuideLst xmlns:p15="http://schemas.microsoft.com/office/powerpoint/2012/main" xmlns="">
         <p15:guide id="1" pos="3839" userDrawn="1">
           <p15:clr>
             <a:srgbClr val="F26B43"/>
@@ -4158,10 +4160,643 @@
       </p:transition>
     </mc:Fallback>
   </mc:AlternateContent>
+  <p:timing>
+    <p:tnLst>
+      <p:par>
+        <p:cTn xmlns:p14="http://schemas.microsoft.com/office/powerpoint/2010/main" id="1" dur="indefinite" restart="never" nodeType="tmRoot"/>
+      </p:par>
+    </p:tnLst>
+  </p:timing>
 </p:sld>
 </file>
 
 <file path=ppt/slides/slide10.xml><?xml version="1.0" encoding="utf-8"?>
+<p:sld xmlns:a="http://schemas.openxmlformats.org/drawingml/2006/main" xmlns:r="http://schemas.openxmlformats.org/officeDocument/2006/relationships" xmlns:p="http://schemas.openxmlformats.org/presentationml/2006/main">
+  <p:cSld>
+    <p:spTree>
+      <p:nvGrpSpPr>
+        <p:cNvPr id="1" name=""/>
+        <p:cNvGrpSpPr/>
+        <p:nvPr/>
+      </p:nvGrpSpPr>
+      <p:grpSpPr>
+        <a:xfrm>
+          <a:off x="0" y="0"/>
+          <a:ext cx="0" cy="0"/>
+          <a:chOff x="0" y="0"/>
+          <a:chExt cx="0" cy="0"/>
+        </a:xfrm>
+      </p:grpSpPr>
+      <p:sp>
+        <p:nvSpPr>
+          <p:cNvPr id="2" name="Title 1"/>
+          <p:cNvSpPr>
+            <a:spLocks noGrp="1"/>
+          </p:cNvSpPr>
+          <p:nvPr>
+            <p:ph type="title"/>
+          </p:nvPr>
+        </p:nvSpPr>
+        <p:spPr/>
+        <p:txBody>
+          <a:bodyPr/>
+          <a:lstStyle/>
+          <a:p>
+            <a:r>
+              <a:rPr lang="en-US" dirty="0" smtClean="0"/>
+              <a:t>Proof of authentication</a:t>
+            </a:r>
+            <a:endParaRPr lang="en-US" dirty="0"/>
+          </a:p>
+        </p:txBody>
+      </p:sp>
+      <p:sp>
+        <p:nvSpPr>
+          <p:cNvPr id="3" name="Content Placeholder 2"/>
+          <p:cNvSpPr>
+            <a:spLocks noGrp="1"/>
+          </p:cNvSpPr>
+          <p:nvPr>
+            <p:ph sz="half" idx="1"/>
+          </p:nvPr>
+        </p:nvSpPr>
+        <p:spPr/>
+        <p:txBody>
+          <a:bodyPr>
+            <a:normAutofit fontScale="92500" lnSpcReduction="10000"/>
+          </a:bodyPr>
+          <a:lstStyle/>
+          <a:p>
+            <a:r>
+              <a:rPr lang="en-US" dirty="0" smtClean="0"/>
+              <a:t>t2 </a:t>
+            </a:r>
+            <a:r>
+              <a:rPr lang="mr-IN" dirty="0" smtClean="0"/>
+              <a:t>–</a:t>
+            </a:r>
+            <a:r>
+              <a:rPr lang="en-US" dirty="0" smtClean="0"/>
+              <a:t> </a:t>
+            </a:r>
+            <a:r>
+              <a:rPr lang="en-US" dirty="0" err="1" smtClean="0"/>
+              <a:t>g^s</a:t>
+            </a:r>
+            <a:endParaRPr lang="en-US" dirty="0" smtClean="0"/>
+          </a:p>
+          <a:p>
+            <a:r>
+              <a:rPr lang="en-US" dirty="0" smtClean="0"/>
+              <a:t>t1 </a:t>
+            </a:r>
+            <a:r>
+              <a:rPr lang="mr-IN" dirty="0" smtClean="0"/>
+              <a:t>–</a:t>
+            </a:r>
+            <a:r>
+              <a:rPr lang="en-US" dirty="0" smtClean="0"/>
+              <a:t> initial t sent by client (</a:t>
+            </a:r>
+            <a:r>
+              <a:rPr lang="en-US" dirty="0" err="1" smtClean="0"/>
+              <a:t>g^r</a:t>
+            </a:r>
+            <a:r>
+              <a:rPr lang="en-US" dirty="0" smtClean="0"/>
+              <a:t>) where </a:t>
+            </a:r>
+          </a:p>
+          <a:p>
+            <a:pPr lvl="1"/>
+            <a:r>
+              <a:rPr lang="en-US" dirty="0" smtClean="0"/>
+              <a:t>g </a:t>
+            </a:r>
+            <a:r>
+              <a:rPr lang="mr-IN" dirty="0" smtClean="0"/>
+              <a:t>–</a:t>
+            </a:r>
+            <a:r>
+              <a:rPr lang="en-US" dirty="0" smtClean="0"/>
+              <a:t> generator of cyclic group</a:t>
+            </a:r>
+          </a:p>
+          <a:p>
+            <a:pPr lvl="1"/>
+            <a:r>
+              <a:rPr lang="en-US" dirty="0" smtClean="0"/>
+              <a:t>r </a:t>
+            </a:r>
+            <a:r>
+              <a:rPr lang="mr-IN" dirty="0" smtClean="0"/>
+              <a:t>–</a:t>
+            </a:r>
+            <a:r>
+              <a:rPr lang="en-US" dirty="0" smtClean="0"/>
+              <a:t> random # chosen by client</a:t>
+            </a:r>
+          </a:p>
+          <a:p>
+            <a:r>
+              <a:rPr lang="en-US" dirty="0" smtClean="0"/>
+              <a:t>Y </a:t>
+            </a:r>
+            <a:r>
+              <a:rPr lang="mr-IN" dirty="0" smtClean="0"/>
+              <a:t>–</a:t>
+            </a:r>
+            <a:r>
+              <a:rPr lang="en-US" dirty="0" smtClean="0"/>
+              <a:t> hash(x) where x is user’s password</a:t>
+            </a:r>
+          </a:p>
+          <a:p>
+            <a:r>
+              <a:rPr lang="en-US" dirty="0" smtClean="0"/>
+              <a:t>c </a:t>
+            </a:r>
+            <a:r>
+              <a:rPr lang="mr-IN" dirty="0" smtClean="0"/>
+              <a:t>–</a:t>
+            </a:r>
+            <a:r>
+              <a:rPr lang="en-US" dirty="0" smtClean="0"/>
+              <a:t> random # chosen by server</a:t>
+            </a:r>
+          </a:p>
+          <a:p>
+            <a:r>
+              <a:rPr lang="en-US" dirty="0" smtClean="0"/>
+              <a:t>s </a:t>
+            </a:r>
+            <a:r>
+              <a:rPr lang="mr-IN" dirty="0" smtClean="0"/>
+              <a:t>–</a:t>
+            </a:r>
+            <a:r>
+              <a:rPr lang="en-US" dirty="0" smtClean="0"/>
+              <a:t> calculated by client and sent ( = r + xc)  = </a:t>
+            </a:r>
+            <a:endParaRPr lang="en-US" dirty="0"/>
+          </a:p>
+        </p:txBody>
+      </p:sp>
+      <p:pic>
+        <p:nvPicPr>
+          <p:cNvPr id="5" name="Content Placeholder 4" descr="Screen Shot 2017-05-12 at 8.05.19 AM.png"/>
+          <p:cNvPicPr>
+            <a:picLocks noGrp="1" noChangeAspect="1"/>
+          </p:cNvPicPr>
+          <p:nvPr>
+            <p:ph sz="half" idx="2"/>
+          </p:nvPr>
+        </p:nvPicPr>
+        <p:blipFill>
+          <a:blip r:embed="rId2">
+            <a:extLst>
+              <a:ext uri="{28A0092B-C50C-407E-A947-70E740481C1C}">
+                <a14:useLocalDpi xmlns:a14="http://schemas.microsoft.com/office/drawing/2010/main" val="0"/>
+              </a:ext>
+            </a:extLst>
+          </a:blip>
+          <a:srcRect l="27837" r="27837"/>
+          <a:stretch>
+            <a:fillRect/>
+          </a:stretch>
+        </p:blipFill>
+        <p:spPr/>
+      </p:pic>
+    </p:spTree>
+    <p:extLst>
+      <p:ext uri="{BB962C8B-B14F-4D97-AF65-F5344CB8AC3E}">
+        <p14:creationId xmlns:p14="http://schemas.microsoft.com/office/powerpoint/2010/main" val="3784145269"/>
+      </p:ext>
+    </p:extLst>
+  </p:cSld>
+  <p:clrMapOvr>
+    <a:masterClrMapping/>
+  </p:clrMapOvr>
+  <mc:AlternateContent xmlns:mc="http://schemas.openxmlformats.org/markup-compatibility/2006" xmlns:p14="http://schemas.microsoft.com/office/powerpoint/2010/main">
+    <mc:Choice Requires="p14">
+      <p:transition spd="med" p14:dur="700">
+        <p:fade/>
+      </p:transition>
+    </mc:Choice>
+    <mc:Fallback xmlns="">
+      <p:transition spd="med">
+        <p:fade/>
+      </p:transition>
+    </mc:Fallback>
+  </mc:AlternateContent>
+  <p:timing>
+    <p:tnLst>
+      <p:par>
+        <p:cTn xmlns:p14="http://schemas.microsoft.com/office/powerpoint/2010/main" id="1" dur="indefinite" restart="never" nodeType="tmRoot"/>
+      </p:par>
+    </p:tnLst>
+  </p:timing>
+</p:sld>
+</file>
+
+<file path=ppt/slides/slide11.xml><?xml version="1.0" encoding="utf-8"?>
+<p:sld xmlns:a="http://schemas.openxmlformats.org/drawingml/2006/main" xmlns:r="http://schemas.openxmlformats.org/officeDocument/2006/relationships" xmlns:p="http://schemas.openxmlformats.org/presentationml/2006/main">
+  <p:cSld>
+    <p:spTree>
+      <p:nvGrpSpPr>
+        <p:cNvPr id="1" name=""/>
+        <p:cNvGrpSpPr/>
+        <p:nvPr/>
+      </p:nvGrpSpPr>
+      <p:grpSpPr>
+        <a:xfrm>
+          <a:off x="0" y="0"/>
+          <a:ext cx="0" cy="0"/>
+          <a:chOff x="0" y="0"/>
+          <a:chExt cx="0" cy="0"/>
+        </a:xfrm>
+      </p:grpSpPr>
+      <p:sp>
+        <p:nvSpPr>
+          <p:cNvPr id="2" name="Title 1"/>
+          <p:cNvSpPr>
+            <a:spLocks noGrp="1"/>
+          </p:cNvSpPr>
+          <p:nvPr>
+            <p:ph type="title"/>
+          </p:nvPr>
+        </p:nvSpPr>
+        <p:spPr/>
+        <p:txBody>
+          <a:bodyPr/>
+          <a:lstStyle/>
+          <a:p>
+            <a:r>
+              <a:rPr lang="en-US" dirty="0" smtClean="0"/>
+              <a:t>Information held at each end</a:t>
+            </a:r>
+            <a:endParaRPr lang="en-US" dirty="0"/>
+          </a:p>
+        </p:txBody>
+      </p:sp>
+      <p:sp>
+        <p:nvSpPr>
+          <p:cNvPr id="3" name="Content Placeholder 2"/>
+          <p:cNvSpPr>
+            <a:spLocks noGrp="1"/>
+          </p:cNvSpPr>
+          <p:nvPr>
+            <p:ph sz="half" idx="1"/>
+          </p:nvPr>
+        </p:nvSpPr>
+        <p:spPr/>
+        <p:txBody>
+          <a:bodyPr/>
+          <a:lstStyle/>
+          <a:p>
+            <a:r>
+              <a:rPr lang="en-US" dirty="0" smtClean="0"/>
+              <a:t>SERVER</a:t>
+            </a:r>
+          </a:p>
+          <a:p>
+            <a:pPr lvl="1"/>
+            <a:r>
+              <a:rPr lang="en-US" dirty="0" smtClean="0"/>
+              <a:t>n </a:t>
+            </a:r>
+            <a:r>
+              <a:rPr lang="mr-IN" dirty="0" smtClean="0"/>
+              <a:t>–</a:t>
+            </a:r>
+            <a:r>
+              <a:rPr lang="en-US" dirty="0" smtClean="0"/>
+              <a:t> order of cyclic group</a:t>
+            </a:r>
+          </a:p>
+          <a:p>
+            <a:pPr lvl="1"/>
+            <a:r>
+              <a:rPr lang="en-US" dirty="0" smtClean="0"/>
+              <a:t>g </a:t>
+            </a:r>
+            <a:r>
+              <a:rPr lang="mr-IN" dirty="0" smtClean="0"/>
+              <a:t>–</a:t>
+            </a:r>
+            <a:r>
+              <a:rPr lang="en-US" dirty="0" smtClean="0"/>
+              <a:t> generator of group</a:t>
+            </a:r>
+          </a:p>
+          <a:p>
+            <a:pPr lvl="1"/>
+            <a:r>
+              <a:rPr lang="en-US" dirty="0" smtClean="0"/>
+              <a:t>username &amp; y </a:t>
+            </a:r>
+            <a:r>
+              <a:rPr lang="mr-IN" dirty="0" smtClean="0"/>
+              <a:t>–</a:t>
+            </a:r>
+            <a:r>
+              <a:rPr lang="en-US" dirty="0" smtClean="0"/>
+              <a:t> </a:t>
+            </a:r>
+            <a:r>
+              <a:rPr lang="en-US" dirty="0" err="1" smtClean="0"/>
+              <a:t>g^hash</a:t>
+            </a:r>
+            <a:r>
+              <a:rPr lang="en-US" dirty="0" smtClean="0"/>
+              <a:t>(password)</a:t>
+            </a:r>
+          </a:p>
+          <a:p>
+            <a:pPr lvl="1"/>
+            <a:r>
+              <a:rPr lang="en-US" dirty="0" smtClean="0"/>
+              <a:t>t1  - first t sent by client (=</a:t>
+            </a:r>
+            <a:r>
+              <a:rPr lang="en-US" dirty="0" err="1" smtClean="0"/>
+              <a:t>g^r</a:t>
+            </a:r>
+            <a:r>
+              <a:rPr lang="en-US" dirty="0" smtClean="0"/>
+              <a:t>)</a:t>
+            </a:r>
+          </a:p>
+          <a:p>
+            <a:pPr lvl="1"/>
+            <a:r>
+              <a:rPr lang="en-US" dirty="0" smtClean="0"/>
+              <a:t>c </a:t>
+            </a:r>
+            <a:r>
+              <a:rPr lang="mr-IN" dirty="0" smtClean="0"/>
+              <a:t>–</a:t>
+            </a:r>
+            <a:r>
+              <a:rPr lang="en-US" dirty="0" smtClean="0"/>
+              <a:t> random </a:t>
+            </a:r>
+            <a:r>
+              <a:rPr lang="en-US" dirty="0" err="1" smtClean="0"/>
+              <a:t>int</a:t>
+            </a:r>
+            <a:r>
+              <a:rPr lang="en-US" dirty="0" smtClean="0"/>
+              <a:t> chosen by server</a:t>
+            </a:r>
+          </a:p>
+          <a:p>
+            <a:pPr lvl="1"/>
+            <a:r>
+              <a:rPr lang="en-US" dirty="0" smtClean="0"/>
+              <a:t>s </a:t>
+            </a:r>
+            <a:r>
+              <a:rPr lang="mr-IN" dirty="0" smtClean="0"/>
+              <a:t>–</a:t>
+            </a:r>
+            <a:r>
+              <a:rPr lang="en-US" dirty="0" smtClean="0"/>
+              <a:t> computed and sent by client</a:t>
+            </a:r>
+          </a:p>
+          <a:p>
+            <a:pPr lvl="1"/>
+            <a:endParaRPr lang="en-US" dirty="0" smtClean="0"/>
+          </a:p>
+          <a:p>
+            <a:pPr lvl="1"/>
+            <a:endParaRPr lang="en-US" dirty="0"/>
+          </a:p>
+        </p:txBody>
+      </p:sp>
+      <p:sp>
+        <p:nvSpPr>
+          <p:cNvPr id="4" name="Content Placeholder 3"/>
+          <p:cNvSpPr>
+            <a:spLocks noGrp="1"/>
+          </p:cNvSpPr>
+          <p:nvPr>
+            <p:ph sz="half" idx="2"/>
+          </p:nvPr>
+        </p:nvSpPr>
+        <p:spPr/>
+        <p:txBody>
+          <a:bodyPr/>
+          <a:lstStyle/>
+          <a:p>
+            <a:r>
+              <a:rPr lang="en-US" dirty="0" smtClean="0"/>
+              <a:t>CLIENT</a:t>
+            </a:r>
+          </a:p>
+          <a:p>
+            <a:pPr lvl="1"/>
+            <a:r>
+              <a:rPr lang="en-US" dirty="0" smtClean="0"/>
+              <a:t>n </a:t>
+            </a:r>
+            <a:r>
+              <a:rPr lang="mr-IN" dirty="0" smtClean="0"/>
+              <a:t>–</a:t>
+            </a:r>
+            <a:r>
+              <a:rPr lang="en-US" dirty="0" smtClean="0"/>
+              <a:t> order of cyclic group</a:t>
+            </a:r>
+          </a:p>
+          <a:p>
+            <a:pPr lvl="1"/>
+            <a:r>
+              <a:rPr lang="en-US" dirty="0" smtClean="0"/>
+              <a:t>g </a:t>
+            </a:r>
+            <a:r>
+              <a:rPr lang="mr-IN" dirty="0" smtClean="0"/>
+              <a:t>–</a:t>
+            </a:r>
+            <a:r>
+              <a:rPr lang="en-US" dirty="0" smtClean="0"/>
+              <a:t> generator of group</a:t>
+            </a:r>
+          </a:p>
+          <a:p>
+            <a:pPr lvl="1"/>
+            <a:r>
+              <a:rPr lang="en-US" dirty="0" smtClean="0"/>
+              <a:t>x </a:t>
+            </a:r>
+            <a:r>
+              <a:rPr lang="mr-IN" dirty="0" smtClean="0"/>
+              <a:t>–</a:t>
+            </a:r>
+            <a:r>
+              <a:rPr lang="en-US" dirty="0" smtClean="0"/>
+              <a:t> hash (password)</a:t>
+            </a:r>
+          </a:p>
+          <a:p>
+            <a:pPr lvl="1"/>
+            <a:r>
+              <a:rPr lang="en-US" dirty="0" smtClean="0"/>
+              <a:t>y </a:t>
+            </a:r>
+            <a:r>
+              <a:rPr lang="mr-IN" dirty="0" smtClean="0"/>
+              <a:t>–</a:t>
+            </a:r>
+            <a:r>
+              <a:rPr lang="en-US" dirty="0" smtClean="0"/>
+              <a:t> g ^ x</a:t>
+            </a:r>
+          </a:p>
+          <a:p>
+            <a:pPr lvl="1"/>
+            <a:r>
+              <a:rPr lang="en-US" dirty="0" smtClean="0"/>
+              <a:t>r </a:t>
+            </a:r>
+            <a:r>
+              <a:rPr lang="mr-IN" dirty="0" smtClean="0"/>
+              <a:t>–</a:t>
+            </a:r>
+            <a:r>
+              <a:rPr lang="en-US" dirty="0" smtClean="0"/>
+              <a:t> random in chosen by client</a:t>
+            </a:r>
+          </a:p>
+          <a:p>
+            <a:pPr lvl="1"/>
+            <a:r>
+              <a:rPr lang="en-US" dirty="0" smtClean="0"/>
+              <a:t>t1 </a:t>
+            </a:r>
+            <a:r>
+              <a:rPr lang="mr-IN" dirty="0" smtClean="0"/>
+              <a:t>–</a:t>
+            </a:r>
+            <a:r>
+              <a:rPr lang="en-US" dirty="0" smtClean="0"/>
+              <a:t> created by client ( = </a:t>
+            </a:r>
+            <a:r>
+              <a:rPr lang="en-US" dirty="0" err="1" smtClean="0"/>
+              <a:t>g^r</a:t>
+            </a:r>
+            <a:r>
+              <a:rPr lang="en-US" dirty="0" smtClean="0"/>
+              <a:t>)</a:t>
+            </a:r>
+          </a:p>
+          <a:p>
+            <a:pPr lvl="1"/>
+            <a:r>
+              <a:rPr lang="en-US" dirty="0" smtClean="0"/>
+              <a:t>c </a:t>
+            </a:r>
+            <a:r>
+              <a:rPr lang="mr-IN" dirty="0" smtClean="0"/>
+              <a:t>–</a:t>
+            </a:r>
+            <a:r>
+              <a:rPr lang="en-US" dirty="0" smtClean="0"/>
+              <a:t> random </a:t>
+            </a:r>
+            <a:r>
+              <a:rPr lang="en-US" dirty="0" err="1" smtClean="0"/>
+              <a:t>int</a:t>
+            </a:r>
+            <a:r>
+              <a:rPr lang="en-US" dirty="0" smtClean="0"/>
+              <a:t> chosen by server</a:t>
+            </a:r>
+          </a:p>
+          <a:p>
+            <a:pPr lvl="1"/>
+            <a:r>
+              <a:rPr lang="en-US" dirty="0" smtClean="0"/>
+              <a:t>s </a:t>
+            </a:r>
+            <a:r>
+              <a:rPr lang="mr-IN" dirty="0" smtClean="0"/>
+              <a:t>–</a:t>
+            </a:r>
+            <a:r>
+              <a:rPr lang="en-US" dirty="0" smtClean="0"/>
+              <a:t> computed response (=r + cx)</a:t>
+            </a:r>
+            <a:endParaRPr lang="en-US" dirty="0"/>
+          </a:p>
+        </p:txBody>
+      </p:sp>
+      <p:sp>
+        <p:nvSpPr>
+          <p:cNvPr id="5" name="TextBox 4"/>
+          <p:cNvSpPr txBox="1"/>
+          <p:nvPr/>
+        </p:nvSpPr>
+        <p:spPr>
+          <a:xfrm>
+            <a:off x="621804" y="5373216"/>
+            <a:ext cx="3329532" cy="369332"/>
+          </a:xfrm>
+          <a:prstGeom prst="rect">
+            <a:avLst/>
+          </a:prstGeom>
+          <a:noFill/>
+        </p:spPr>
+        <p:txBody>
+          <a:bodyPr wrap="none" rtlCol="0">
+            <a:spAutoFit/>
+          </a:bodyPr>
+          <a:lstStyle/>
+          <a:p>
+            <a:r>
+              <a:rPr lang="en-US" dirty="0" smtClean="0"/>
+              <a:t>note the absence of x in SERVER!</a:t>
+            </a:r>
+            <a:endParaRPr lang="en-US" dirty="0"/>
+          </a:p>
+        </p:txBody>
+      </p:sp>
+    </p:spTree>
+    <p:extLst>
+      <p:ext uri="{BB962C8B-B14F-4D97-AF65-F5344CB8AC3E}">
+        <p14:creationId xmlns:p14="http://schemas.microsoft.com/office/powerpoint/2010/main" val="3221276574"/>
+      </p:ext>
+    </p:extLst>
+  </p:cSld>
+  <p:clrMapOvr>
+    <a:masterClrMapping/>
+  </p:clrMapOvr>
+  <mc:AlternateContent xmlns:mc="http://schemas.openxmlformats.org/markup-compatibility/2006" xmlns:p14="http://schemas.microsoft.com/office/powerpoint/2010/main">
+    <mc:Choice Requires="p14">
+      <p:transition spd="med" p14:dur="700">
+        <p:fade/>
+      </p:transition>
+    </mc:Choice>
+    <mc:Fallback xmlns="">
+      <p:transition spd="med">
+        <p:fade/>
+      </p:transition>
+    </mc:Fallback>
+  </mc:AlternateContent>
+  <p:timing>
+    <p:tnLst>
+      <p:par>
+        <p:cTn xmlns:p14="http://schemas.microsoft.com/office/powerpoint/2010/main" id="1" dur="indefinite" restart="never" nodeType="tmRoot"/>
+      </p:par>
+    </p:tnLst>
+  </p:timing>
+</p:sld>
+</file>
+
+<file path=ppt/slides/slide12.xml><?xml version="1.0" encoding="utf-8"?>
 <p:sld xmlns:a="http://schemas.openxmlformats.org/drawingml/2006/main" xmlns:r="http://schemas.openxmlformats.org/officeDocument/2006/relationships" xmlns:p="http://schemas.openxmlformats.org/presentationml/2006/main">
   <p:cSld>
     <p:spTree>
@@ -4320,10 +4955,17 @@
       </p:transition>
     </mc:Fallback>
   </mc:AlternateContent>
+  <p:timing>
+    <p:tnLst>
+      <p:par>
+        <p:cTn xmlns:p14="http://schemas.microsoft.com/office/powerpoint/2010/main" id="1" dur="indefinite" restart="never" nodeType="tmRoot"/>
+      </p:par>
+    </p:tnLst>
+  </p:timing>
 </p:sld>
 </file>
 
-<file path=ppt/slides/slide11.xml><?xml version="1.0" encoding="utf-8"?>
+<file path=ppt/slides/slide13.xml><?xml version="1.0" encoding="utf-8"?>
 <p:sld xmlns:a="http://schemas.openxmlformats.org/drawingml/2006/main" xmlns:r="http://schemas.openxmlformats.org/officeDocument/2006/relationships" xmlns:p="http://schemas.openxmlformats.org/presentationml/2006/main">
   <p:cSld>
     <p:spTree>
@@ -4802,8 +5444,8 @@
           </a:fontRef>
         </p:style>
       </p:cxnSp>
-      <mc:AlternateContent xmlns:mc="http://schemas.openxmlformats.org/markup-compatibility/2006">
-        <mc:Choice xmlns:a14="http://schemas.microsoft.com/office/drawing/2010/main" Requires="a14">
+      <mc:AlternateContent xmlns:mc="http://schemas.openxmlformats.org/markup-compatibility/2006" xmlns:a14="http://schemas.microsoft.com/office/drawing/2010/main">
+        <mc:Choice Requires="a14">
           <p:sp>
             <p:nvSpPr>
               <p:cNvPr id="20" name="ZoneTexte 19"/>
@@ -4831,7 +5473,7 @@
                   <a:t>T = </a:t>
                 </a:r>
                 <a14:m>
-                  <m:oMath xmlns:m="http://schemas.openxmlformats.org/officeDocument/2006/math">
+                  <m:oMath xmlns:m="http://schemas.openxmlformats.org/officeDocument/2006/math" xmlns="">
                     <m:sSup>
                       <m:sSupPr>
                         <m:ctrlPr>
@@ -4891,7 +5533,7 @@
             </p:txBody>
           </p:sp>
         </mc:Choice>
-        <mc:Fallback>
+        <mc:Fallback xmlns="">
           <p:sp>
             <p:nvSpPr>
               <p:cNvPr id="20" name="ZoneTexte 19"/>
@@ -4988,8 +5630,8 @@
           </a:p>
         </p:txBody>
       </p:sp>
-      <mc:AlternateContent xmlns:mc="http://schemas.openxmlformats.org/markup-compatibility/2006">
-        <mc:Choice xmlns:a14="http://schemas.microsoft.com/office/drawing/2010/main" Requires="a14">
+      <mc:AlternateContent xmlns:mc="http://schemas.openxmlformats.org/markup-compatibility/2006" xmlns:a14="http://schemas.microsoft.com/office/drawing/2010/main">
+        <mc:Choice Requires="a14">
           <p:sp>
             <p:nvSpPr>
               <p:cNvPr id="24" name="ZoneTexte 23"/>
@@ -5039,7 +5681,7 @@
               </a:p>
               <a:p>
                 <a14:m>
-                  <m:oMathPara xmlns:m="http://schemas.openxmlformats.org/officeDocument/2006/math">
+                  <m:oMathPara xmlns:m="http://schemas.openxmlformats.org/officeDocument/2006/math" xmlns="">
                     <m:oMathParaPr>
                       <m:jc m:val="centerGroup"/>
                     </m:oMathParaPr>
@@ -5235,7 +5877,7 @@
                   <a:t> </a:t>
                 </a:r>
                 <a14:m>
-                  <m:oMath xmlns:m="http://schemas.openxmlformats.org/officeDocument/2006/math">
+                  <m:oMath xmlns:m="http://schemas.openxmlformats.org/officeDocument/2006/math" xmlns="">
                     <m:sSup>
                       <m:sSupPr>
                         <m:ctrlPr>
@@ -5464,7 +6106,7 @@
             </p:txBody>
           </p:sp>
         </mc:Choice>
-        <mc:Fallback>
+        <mc:Fallback xmlns="">
           <p:sp>
             <p:nvSpPr>
               <p:cNvPr id="24" name="ZoneTexte 23"/>
@@ -5525,10 +6167,17 @@
       </p:transition>
     </mc:Fallback>
   </mc:AlternateContent>
+  <p:timing>
+    <p:tnLst>
+      <p:par>
+        <p:cTn xmlns:p14="http://schemas.microsoft.com/office/powerpoint/2010/main" id="1" dur="indefinite" restart="never" nodeType="tmRoot"/>
+      </p:par>
+    </p:tnLst>
+  </p:timing>
 </p:sld>
 </file>
 
-<file path=ppt/slides/slide12.xml><?xml version="1.0" encoding="utf-8"?>
+<file path=ppt/slides/slide14.xml><?xml version="1.0" encoding="utf-8"?>
 <p:sld xmlns:a="http://schemas.openxmlformats.org/drawingml/2006/main" xmlns:r="http://schemas.openxmlformats.org/officeDocument/2006/relationships" xmlns:p="http://schemas.openxmlformats.org/presentationml/2006/main">
   <p:cSld>
     <p:spTree>
@@ -5568,6 +6217,10 @@
             <a:r>
               <a:rPr lang="fr-FR" dirty="0" err="1"/>
               <a:t>Voting</a:t>
+            </a:r>
+            <a:r>
+              <a:rPr lang="fr-FR" dirty="0"/>
+              <a:t/>
             </a:r>
             <a:br>
               <a:rPr lang="fr-FR" dirty="0"/>
@@ -5674,7 +6327,7 @@
 </p:sld>
 </file>
 
-<file path=ppt/slides/slide13.xml><?xml version="1.0" encoding="utf-8"?>
+<file path=ppt/slides/slide15.xml><?xml version="1.0" encoding="utf-8"?>
 <p:sld xmlns:a="http://schemas.openxmlformats.org/drawingml/2006/main" xmlns:r="http://schemas.openxmlformats.org/officeDocument/2006/relationships" xmlns:p="http://schemas.openxmlformats.org/presentationml/2006/main">
   <p:cSld>
     <p:spTree>
@@ -5744,7 +6397,7 @@
 </p:sld>
 </file>
 
-<file path=ppt/slides/slide14.xml><?xml version="1.0" encoding="utf-8"?>
+<file path=ppt/slides/slide16.xml><?xml version="1.0" encoding="utf-8"?>
 <p:sld xmlns:a="http://schemas.openxmlformats.org/drawingml/2006/main" xmlns:r="http://schemas.openxmlformats.org/officeDocument/2006/relationships" xmlns:p="http://schemas.openxmlformats.org/presentationml/2006/main">
   <p:cSld>
     <p:spTree>
@@ -5876,7 +6529,7 @@
 </p:sld>
 </file>
 
-<file path=ppt/slides/slide15.xml><?xml version="1.0" encoding="utf-8"?>
+<file path=ppt/slides/slide17.xml><?xml version="1.0" encoding="utf-8"?>
 <p:sld xmlns:a="http://schemas.openxmlformats.org/drawingml/2006/main" xmlns:r="http://schemas.openxmlformats.org/officeDocument/2006/relationships" xmlns:p="http://schemas.openxmlformats.org/presentationml/2006/main">
   <p:cSld>
     <p:spTree>
@@ -6111,6 +6764,13 @@
       </p:transition>
     </mc:Fallback>
   </mc:AlternateContent>
+  <p:timing>
+    <p:tnLst>
+      <p:par>
+        <p:cTn xmlns:p14="http://schemas.microsoft.com/office/powerpoint/2010/main" id="1" dur="indefinite" restart="never" nodeType="tmRoot"/>
+      </p:par>
+    </p:tnLst>
+  </p:timing>
 </p:sld>
 </file>
 
@@ -6220,6 +6880,13 @@
       </p:transition>
     </mc:Fallback>
   </mc:AlternateContent>
+  <p:timing>
+    <p:tnLst>
+      <p:par>
+        <p:cTn xmlns:p14="http://schemas.microsoft.com/office/powerpoint/2010/main" id="1" dur="indefinite" restart="never" nodeType="tmRoot"/>
+      </p:par>
+    </p:tnLst>
+  </p:timing>
 </p:sld>
 </file>
 
@@ -6347,7 +7014,7 @@
           </a:prstGeom>
           <a:noFill/>
           <a:extLst>
-            <a:ext uri="{909E8E84-426E-40DD-AFC4-6F175D3DCCD1}">
+            <a:ext uri="{909E8E84-426E-40dd-AFC4-6F175D3DCCD1}">
               <a14:hiddenFill xmlns:a14="http://schemas.microsoft.com/office/drawing/2010/main">
                 <a:solidFill>
                   <a:srgbClr val="FFFFFF"/>
@@ -6379,6 +7046,13 @@
       </p:transition>
     </mc:Fallback>
   </mc:AlternateContent>
+  <p:timing>
+    <p:tnLst>
+      <p:par>
+        <p:cTn xmlns:p14="http://schemas.microsoft.com/office/powerpoint/2010/main" id="1" dur="indefinite" restart="never" nodeType="tmRoot"/>
+      </p:par>
+    </p:tnLst>
+  </p:timing>
 </p:sld>
 </file>
 
@@ -6488,7 +7162,7 @@
           </a:prstGeom>
           <a:noFill/>
           <a:extLst>
-            <a:ext uri="{909E8E84-426E-40DD-AFC4-6F175D3DCCD1}">
+            <a:ext uri="{909E8E84-426E-40dd-AFC4-6F175D3DCCD1}">
               <a14:hiddenFill xmlns:a14="http://schemas.microsoft.com/office/drawing/2010/main">
                 <a:solidFill>
                   <a:srgbClr val="FFFFFF"/>
@@ -6520,6 +7194,13 @@
       </p:transition>
     </mc:Fallback>
   </mc:AlternateContent>
+  <p:timing>
+    <p:tnLst>
+      <p:par>
+        <p:cTn xmlns:p14="http://schemas.microsoft.com/office/powerpoint/2010/main" id="1" dur="indefinite" restart="never" nodeType="tmRoot"/>
+      </p:par>
+    </p:tnLst>
+  </p:timing>
 </p:sld>
 </file>
 
@@ -6684,7 +7365,7 @@
           </a:prstGeom>
           <a:noFill/>
           <a:extLst>
-            <a:ext uri="{909E8E84-426E-40DD-AFC4-6F175D3DCCD1}">
+            <a:ext uri="{909E8E84-426E-40dd-AFC4-6F175D3DCCD1}">
               <a14:hiddenFill xmlns:a14="http://schemas.microsoft.com/office/drawing/2010/main">
                 <a:solidFill>
                   <a:srgbClr val="FFFFFF"/>
@@ -6716,6 +7397,13 @@
       </p:transition>
     </mc:Fallback>
   </mc:AlternateContent>
+  <p:timing>
+    <p:tnLst>
+      <p:par>
+        <p:cTn xmlns:p14="http://schemas.microsoft.com/office/powerpoint/2010/main" id="1" dur="indefinite" restart="never" nodeType="tmRoot"/>
+      </p:par>
+    </p:tnLst>
+  </p:timing>
 </p:sld>
 </file>
 
@@ -6842,7 +7530,7 @@
           </a:prstGeom>
           <a:noFill/>
           <a:extLst>
-            <a:ext uri="{909E8E84-426E-40DD-AFC4-6F175D3DCCD1}">
+            <a:ext uri="{909E8E84-426E-40dd-AFC4-6F175D3DCCD1}">
               <a14:hiddenFill xmlns:a14="http://schemas.microsoft.com/office/drawing/2010/main">
                 <a:solidFill>
                   <a:srgbClr val="FFFFFF"/>
@@ -6883,7 +7571,7 @@
           </a:prstGeom>
           <a:noFill/>
           <a:extLst>
-            <a:ext uri="{909E8E84-426E-40DD-AFC4-6F175D3DCCD1}">
+            <a:ext uri="{909E8E84-426E-40dd-AFC4-6F175D3DCCD1}">
               <a14:hiddenFill xmlns:a14="http://schemas.microsoft.com/office/drawing/2010/main">
                 <a:solidFill>
                   <a:srgbClr val="FFFFFF"/>
@@ -6924,7 +7612,7 @@
           </a:prstGeom>
           <a:noFill/>
           <a:extLst>
-            <a:ext uri="{909E8E84-426E-40DD-AFC4-6F175D3DCCD1}">
+            <a:ext uri="{909E8E84-426E-40dd-AFC4-6F175D3DCCD1}">
               <a14:hiddenFill xmlns:a14="http://schemas.microsoft.com/office/drawing/2010/main">
                 <a:solidFill>
                   <a:srgbClr val="FFFFFF"/>
@@ -6965,7 +7653,7 @@
           </a:prstGeom>
           <a:noFill/>
           <a:extLst>
-            <a:ext uri="{909E8E84-426E-40DD-AFC4-6F175D3DCCD1}">
+            <a:ext uri="{909E8E84-426E-40dd-AFC4-6F175D3DCCD1}">
               <a14:hiddenFill xmlns:a14="http://schemas.microsoft.com/office/drawing/2010/main">
                 <a:solidFill>
                   <a:srgbClr val="FFFFFF"/>
@@ -7006,7 +7694,7 @@
           </a:prstGeom>
           <a:noFill/>
           <a:extLst>
-            <a:ext uri="{909E8E84-426E-40DD-AFC4-6F175D3DCCD1}">
+            <a:ext uri="{909E8E84-426E-40dd-AFC4-6F175D3DCCD1}">
               <a14:hiddenFill xmlns:a14="http://schemas.microsoft.com/office/drawing/2010/main">
                 <a:solidFill>
                   <a:srgbClr val="FFFFFF"/>
@@ -7047,7 +7735,7 @@
           </a:prstGeom>
           <a:noFill/>
           <a:extLst>
-            <a:ext uri="{909E8E84-426E-40DD-AFC4-6F175D3DCCD1}">
+            <a:ext uri="{909E8E84-426E-40dd-AFC4-6F175D3DCCD1}">
               <a14:hiddenFill xmlns:a14="http://schemas.microsoft.com/office/drawing/2010/main">
                 <a:solidFill>
                   <a:srgbClr val="FFFFFF"/>
@@ -7088,7 +7776,7 @@
           </a:prstGeom>
           <a:noFill/>
           <a:extLst>
-            <a:ext uri="{909E8E84-426E-40DD-AFC4-6F175D3DCCD1}">
+            <a:ext uri="{909E8E84-426E-40dd-AFC4-6F175D3DCCD1}">
               <a14:hiddenFill xmlns:a14="http://schemas.microsoft.com/office/drawing/2010/main">
                 <a:solidFill>
                   <a:srgbClr val="FFFFFF"/>
@@ -7129,7 +7817,7 @@
           </a:prstGeom>
           <a:noFill/>
           <a:extLst>
-            <a:ext uri="{909E8E84-426E-40DD-AFC4-6F175D3DCCD1}">
+            <a:ext uri="{909E8E84-426E-40dd-AFC4-6F175D3DCCD1}">
               <a14:hiddenFill xmlns:a14="http://schemas.microsoft.com/office/drawing/2010/main">
                 <a:solidFill>
                   <a:srgbClr val="FFFFFF"/>
@@ -7170,7 +7858,7 @@
           </a:prstGeom>
           <a:noFill/>
           <a:extLst>
-            <a:ext uri="{909E8E84-426E-40DD-AFC4-6F175D3DCCD1}">
+            <a:ext uri="{909E8E84-426E-40dd-AFC4-6F175D3DCCD1}">
               <a14:hiddenFill xmlns:a14="http://schemas.microsoft.com/office/drawing/2010/main">
                 <a:solidFill>
                   <a:srgbClr val="FFFFFF"/>
@@ -7202,6 +7890,13 @@
       </p:transition>
     </mc:Fallback>
   </mc:AlternateContent>
+  <p:timing>
+    <p:tnLst>
+      <p:par>
+        <p:cTn xmlns:p14="http://schemas.microsoft.com/office/powerpoint/2010/main" id="1" dur="indefinite" restart="never" nodeType="tmRoot"/>
+      </p:par>
+    </p:tnLst>
+  </p:timing>
 </p:sld>
 </file>
 
@@ -7282,11 +7977,31 @@
             </a:r>
             <a:r>
               <a:rPr lang="fr-FR" dirty="0"/>
-              <a:t> group and a </a:t>
-            </a:r>
-            <a:r>
-              <a:rPr lang="fr-FR" dirty="0" err="1"/>
+              <a:t> </a:t>
+            </a:r>
+            <a:r>
+              <a:rPr lang="fr-FR" dirty="0" smtClean="0"/>
+              <a:t>group of </a:t>
+            </a:r>
+            <a:r>
+              <a:rPr lang="fr-FR" dirty="0" err="1" smtClean="0"/>
+              <a:t>order</a:t>
+            </a:r>
+            <a:r>
+              <a:rPr lang="fr-FR" dirty="0" smtClean="0"/>
+              <a:t> n </a:t>
+            </a:r>
+            <a:r>
+              <a:rPr lang="fr-FR" dirty="0"/>
+              <a:t>and a </a:t>
+            </a:r>
+            <a:r>
+              <a:rPr lang="fr-FR" dirty="0" err="1" smtClean="0"/>
               <a:t>generator</a:t>
+            </a:r>
+            <a:r>
+              <a:rPr lang="fr-FR" dirty="0" smtClean="0"/>
+              <a:t> g</a:t>
             </a:r>
             <a:endParaRPr lang="fr-FR" dirty="0"/>
           </a:p>
@@ -7392,7 +8107,7 @@
                   <a:t> </a:t>
                 </a:r>
                 <a14:m>
-                  <m:oMath xmlns:m="http://schemas.openxmlformats.org/officeDocument/2006/math">
+                  <m:oMath xmlns:m="http://schemas.openxmlformats.org/officeDocument/2006/math" xmlns="">
                     <m:sSup>
                       <m:sSupPr>
                         <m:ctrlPr>
@@ -7518,6 +8233,13 @@
       </p:transition>
     </mc:Fallback>
   </mc:AlternateContent>
+  <p:timing>
+    <p:tnLst>
+      <p:par>
+        <p:cTn xmlns:p14="http://schemas.microsoft.com/office/powerpoint/2010/main" id="1" dur="indefinite" restart="never" nodeType="tmRoot"/>
+      </p:par>
+    </p:tnLst>
+  </p:timing>
 </p:sld>
 </file>
 
@@ -7789,8 +8511,21 @@
                   <a:schemeClr val="bg1"/>
                 </a:solidFill>
               </a:rPr>
-              <a:t> a</a:t>
-            </a:r>
+              <a:t> </a:t>
+            </a:r>
+            <a:r>
+              <a:rPr lang="fr-FR" dirty="0" smtClean="0">
+                <a:solidFill>
+                  <a:schemeClr val="bg1"/>
+                </a:solidFill>
+              </a:rPr>
+              <a:t>r</a:t>
+            </a:r>
+            <a:endParaRPr lang="fr-FR" dirty="0">
+              <a:solidFill>
+                <a:schemeClr val="bg1"/>
+              </a:solidFill>
+            </a:endParaRPr>
           </a:p>
         </p:txBody>
       </p:sp>
@@ -7895,7 +8630,23 @@
                   <a:schemeClr val="bg1"/>
                 </a:solidFill>
               </a:rPr>
-              <a:t> s=</a:t>
+              <a:t> s</a:t>
+            </a:r>
+            <a:r>
+              <a:rPr lang="fr-FR" dirty="0" smtClean="0">
+                <a:solidFill>
+                  <a:schemeClr val="bg1"/>
+                </a:solidFill>
+              </a:rPr>
+              <a:t>=</a:t>
+            </a:r>
+            <a:r>
+              <a:rPr lang="fr-FR" dirty="0" err="1" smtClean="0">
+                <a:solidFill>
+                  <a:schemeClr val="bg1"/>
+                </a:solidFill>
+              </a:rPr>
+              <a:t>rx+</a:t>
             </a:r>
             <a:r>
               <a:rPr lang="fr-FR" dirty="0" err="1">
@@ -7903,7 +8654,7 @@
                   <a:schemeClr val="bg1"/>
                 </a:solidFill>
               </a:rPr>
-              <a:t>ax+c</a:t>
+              <a:t>c</a:t>
             </a:r>
             <a:endParaRPr lang="fr-FR" dirty="0">
               <a:solidFill>
@@ -8016,8 +8767,8 @@
           </a:fontRef>
         </p:style>
       </p:cxnSp>
-      <mc:AlternateContent xmlns:mc="http://schemas.openxmlformats.org/markup-compatibility/2006" xmlns:a14="http://schemas.microsoft.com/office/drawing/2010/main">
-        <mc:Choice Requires="a14">
+      <mc:AlternateContent xmlns:mc="http://schemas.openxmlformats.org/markup-compatibility/2006">
+        <mc:Choice xmlns:a14="http://schemas.microsoft.com/office/drawing/2010/main" Requires="a14">
           <p:sp>
             <p:nvSpPr>
               <p:cNvPr id="20" name="ZoneTexte 19"/>
@@ -8041,62 +8792,10 @@
               <a:lstStyle/>
               <a:p>
                 <a:r>
-                  <a:rPr lang="fr-FR" dirty="0"/>
+                  <a:rPr lang="fr-FR" dirty="0" smtClean="0"/>
                   <a:t>T = </a:t>
                 </a:r>
-                <a14:m>
-                  <m:oMath xmlns:m="http://schemas.openxmlformats.org/officeDocument/2006/math">
-                    <m:sSup>
-                      <m:sSupPr>
-                        <m:ctrlPr>
-                          <a:rPr lang="fr-FR" i="1">
-                            <a:latin typeface="Cambria Math" panose="02040503050406030204" pitchFamily="18" charset="0"/>
-                          </a:rPr>
-                        </m:ctrlPr>
-                      </m:sSupPr>
-                      <m:e>
-                        <m:r>
-                          <a:rPr lang="fr-FR" i="1">
-                            <a:latin typeface="Cambria Math" panose="02040503050406030204" pitchFamily="18" charset="0"/>
-                          </a:rPr>
-                          <m:t>𝑔</m:t>
-                        </m:r>
-                      </m:e>
-                      <m:sup>
-                        <m:r>
-                          <a:rPr lang="fr-FR" b="0" i="1" smtClean="0">
-                            <a:latin typeface="Cambria Math" panose="02040503050406030204" pitchFamily="18" charset="0"/>
-                          </a:rPr>
-                          <m:t>𝑎</m:t>
-                        </m:r>
-                      </m:sup>
-                    </m:sSup>
-                    <m:r>
-                      <a:rPr lang="fr-FR" b="0" i="1" smtClean="0">
-                        <a:latin typeface="Cambria Math" panose="02040503050406030204" pitchFamily="18" charset="0"/>
-                      </a:rPr>
-                      <m:t> </m:t>
-                    </m:r>
-                    <m:r>
-                      <a:rPr lang="fr-FR" b="0" i="1" smtClean="0">
-                        <a:latin typeface="Cambria Math" panose="02040503050406030204" pitchFamily="18" charset="0"/>
-                      </a:rPr>
-                      <m:t>𝑚𝑜𝑑</m:t>
-                    </m:r>
-                    <m:r>
-                      <a:rPr lang="fr-FR" b="0" i="1" smtClean="0">
-                        <a:latin typeface="Cambria Math" panose="02040503050406030204" pitchFamily="18" charset="0"/>
-                      </a:rPr>
-                      <m:t> </m:t>
-                    </m:r>
-                    <m:r>
-                      <a:rPr lang="fr-FR" b="0" i="1" smtClean="0">
-                        <a:latin typeface="Cambria Math" panose="02040503050406030204" pitchFamily="18" charset="0"/>
-                      </a:rPr>
-                      <m:t>𝑛</m:t>
-                    </m:r>
-                  </m:oMath>
-                </a14:m>
+                <a14:m/>
                 <a:r>
                   <a:rPr lang="fr-FR" dirty="0"/>
                   <a:t> </a:t>
@@ -8105,7 +8804,7 @@
             </p:txBody>
           </p:sp>
         </mc:Choice>
-        <mc:Fallback xmlns="">
+        <mc:Fallback>
           <p:sp>
             <p:nvSpPr>
               <p:cNvPr id="20" name="ZoneTexte 19"/>
@@ -8122,10 +8821,10 @@
               <a:prstGeom prst="rect">
                 <a:avLst/>
               </a:prstGeom>
-              <a:blipFill>
+              <a:blipFill rotWithShape="1">
                 <a:blip r:embed="rId2"/>
                 <a:stretch>
-                  <a:fillRect l="-2932" t="-10000" b="-26667"/>
+                  <a:fillRect/>
                 </a:stretch>
               </a:blipFill>
             </p:spPr>
@@ -8134,7 +8833,7 @@
               <a:lstStyle/>
               <a:p>
                 <a:r>
-                  <a:rPr lang="fr-FR">
+                  <a:rPr lang="en-US">
                     <a:noFill/>
                   </a:rPr>
                   <a:t> </a:t>
@@ -8202,8 +8901,8 @@
           </a:p>
         </p:txBody>
       </p:sp>
-      <mc:AlternateContent xmlns:mc="http://schemas.openxmlformats.org/markup-compatibility/2006">
-        <mc:Choice xmlns:a14="http://schemas.microsoft.com/office/drawing/2010/main" Requires="a14">
+      <mc:AlternateContent xmlns:mc="http://schemas.openxmlformats.org/markup-compatibility/2006" xmlns:a14="http://schemas.microsoft.com/office/drawing/2010/main">
+        <mc:Choice Requires="a14">
           <p:sp>
             <p:nvSpPr>
               <p:cNvPr id="24" name="ZoneTexte 23"/>
@@ -8253,7 +8952,7 @@
               </a:p>
               <a:p>
                 <a14:m>
-                  <m:oMath xmlns:m="http://schemas.openxmlformats.org/officeDocument/2006/math">
+                  <m:oMath xmlns:m="http://schemas.openxmlformats.org/officeDocument/2006/math" xmlns="">
                     <m:sSup>
                       <m:sSupPr>
                         <m:ctrlPr>
@@ -8431,7 +9130,7 @@
             </p:txBody>
           </p:sp>
         </mc:Choice>
-        <mc:Fallback>
+        <mc:Fallback xmlns="">
           <p:sp>
             <p:nvSpPr>
               <p:cNvPr id="24" name="ZoneTexte 23"/>
@@ -8492,6 +9191,13 @@
       </p:transition>
     </mc:Fallback>
   </mc:AlternateContent>
+  <p:timing>
+    <p:tnLst>
+      <p:par>
+        <p:cTn xmlns:p14="http://schemas.microsoft.com/office/powerpoint/2010/main" id="1" dur="indefinite" restart="never" nodeType="tmRoot"/>
+      </p:par>
+    </p:tnLst>
+  </p:timing>
 </p:sld>
 </file>
 
@@ -8756,7 +9462,7 @@
   <a:extraClrSchemeLst/>
   <a:extLst>
     <a:ext uri="{05A4C25C-085E-4340-85A3-A5531E510DB2}">
-      <thm15:themeFamily xmlns:thm15="http://schemas.microsoft.com/office/thememl/2012/main" name="Office_9411905_TF02895261_TF02895261.potx" id="{D591E305-304E-4F08-83F3-B9147EDAAFB5}" vid="{F4994B82-D552-431A-8540-55AA87CE1401}"/>
+      <thm15:themeFamily xmlns:thm15="http://schemas.microsoft.com/office/thememl/2012/main" xmlns="" name="Office_9411905_TF02895261_TF02895261.potx" id="{D591E305-304E-4F08-83F3-B9147EDAAFB5}" vid="{F4994B82-D552-431A-8540-55AA87CE1401}"/>
     </a:ext>
   </a:extLst>
 </a:theme>

</xml_diff>